<commit_message>
evaluation metrics regression done code done
</commit_message>
<xml_diff>
--- a/images/Graphics of ML4Food.pptx
+++ b/images/Graphics of ML4Food.pptx
@@ -285,7 +285,7 @@
           <a:p>
             <a:fld id="{A07DFB82-90C8-4AD3-96A9-E657E1BB76FF}" type="datetimeFigureOut">
               <a:rPr lang="en-GB" smtClean="0"/>
-              <a:t>26/07/2023</a:t>
+              <a:t>28/07/2023</a:t>
             </a:fld>
             <a:endParaRPr lang="en-GB"/>
           </a:p>
@@ -485,7 +485,7 @@
           <a:p>
             <a:fld id="{A07DFB82-90C8-4AD3-96A9-E657E1BB76FF}" type="datetimeFigureOut">
               <a:rPr lang="en-GB" smtClean="0"/>
-              <a:t>26/07/2023</a:t>
+              <a:t>28/07/2023</a:t>
             </a:fld>
             <a:endParaRPr lang="en-GB"/>
           </a:p>
@@ -695,7 +695,7 @@
           <a:p>
             <a:fld id="{A07DFB82-90C8-4AD3-96A9-E657E1BB76FF}" type="datetimeFigureOut">
               <a:rPr lang="en-GB" smtClean="0"/>
-              <a:t>26/07/2023</a:t>
+              <a:t>28/07/2023</a:t>
             </a:fld>
             <a:endParaRPr lang="en-GB"/>
           </a:p>
@@ -895,7 +895,7 @@
           <a:p>
             <a:fld id="{A07DFB82-90C8-4AD3-96A9-E657E1BB76FF}" type="datetimeFigureOut">
               <a:rPr lang="en-GB" smtClean="0"/>
-              <a:t>26/07/2023</a:t>
+              <a:t>28/07/2023</a:t>
             </a:fld>
             <a:endParaRPr lang="en-GB"/>
           </a:p>
@@ -1171,7 +1171,7 @@
           <a:p>
             <a:fld id="{A07DFB82-90C8-4AD3-96A9-E657E1BB76FF}" type="datetimeFigureOut">
               <a:rPr lang="en-GB" smtClean="0"/>
-              <a:t>26/07/2023</a:t>
+              <a:t>28/07/2023</a:t>
             </a:fld>
             <a:endParaRPr lang="en-GB"/>
           </a:p>
@@ -1439,7 +1439,7 @@
           <a:p>
             <a:fld id="{A07DFB82-90C8-4AD3-96A9-E657E1BB76FF}" type="datetimeFigureOut">
               <a:rPr lang="en-GB" smtClean="0"/>
-              <a:t>26/07/2023</a:t>
+              <a:t>28/07/2023</a:t>
             </a:fld>
             <a:endParaRPr lang="en-GB"/>
           </a:p>
@@ -1854,7 +1854,7 @@
           <a:p>
             <a:fld id="{A07DFB82-90C8-4AD3-96A9-E657E1BB76FF}" type="datetimeFigureOut">
               <a:rPr lang="en-GB" smtClean="0"/>
-              <a:t>26/07/2023</a:t>
+              <a:t>28/07/2023</a:t>
             </a:fld>
             <a:endParaRPr lang="en-GB"/>
           </a:p>
@@ -1996,7 +1996,7 @@
           <a:p>
             <a:fld id="{A07DFB82-90C8-4AD3-96A9-E657E1BB76FF}" type="datetimeFigureOut">
               <a:rPr lang="en-GB" smtClean="0"/>
-              <a:t>26/07/2023</a:t>
+              <a:t>28/07/2023</a:t>
             </a:fld>
             <a:endParaRPr lang="en-GB"/>
           </a:p>
@@ -2109,7 +2109,7 @@
           <a:p>
             <a:fld id="{A07DFB82-90C8-4AD3-96A9-E657E1BB76FF}" type="datetimeFigureOut">
               <a:rPr lang="en-GB" smtClean="0"/>
-              <a:t>26/07/2023</a:t>
+              <a:t>28/07/2023</a:t>
             </a:fld>
             <a:endParaRPr lang="en-GB"/>
           </a:p>
@@ -2422,7 +2422,7 @@
           <a:p>
             <a:fld id="{A07DFB82-90C8-4AD3-96A9-E657E1BB76FF}" type="datetimeFigureOut">
               <a:rPr lang="en-GB" smtClean="0"/>
-              <a:t>26/07/2023</a:t>
+              <a:t>28/07/2023</a:t>
             </a:fld>
             <a:endParaRPr lang="en-GB"/>
           </a:p>
@@ -2711,7 +2711,7 @@
           <a:p>
             <a:fld id="{A07DFB82-90C8-4AD3-96A9-E657E1BB76FF}" type="datetimeFigureOut">
               <a:rPr lang="en-GB" smtClean="0"/>
-              <a:t>26/07/2023</a:t>
+              <a:t>28/07/2023</a:t>
             </a:fld>
             <a:endParaRPr lang="en-GB"/>
           </a:p>
@@ -2954,7 +2954,7 @@
           <a:p>
             <a:fld id="{A07DFB82-90C8-4AD3-96A9-E657E1BB76FF}" type="datetimeFigureOut">
               <a:rPr lang="en-GB" smtClean="0"/>
-              <a:t>26/07/2023</a:t>
+              <a:t>28/07/2023</a:t>
             </a:fld>
             <a:endParaRPr lang="en-GB"/>
           </a:p>
@@ -12827,7 +12827,7 @@
           <a:p>
             <a:r>
               <a:rPr lang="en-GB" dirty="0"/>
-              <a:t>Counting missing values*</a:t>
+              <a:t>Counting missing values</a:t>
             </a:r>
           </a:p>
         </p:txBody>
@@ -24718,7 +24718,7 @@
           <p:cNvPr id="2" name="Title 1">
             <a:extLst>
               <a:ext uri="{FF2B5EF4-FFF2-40B4-BE49-F238E27FC236}">
-                <a16:creationId xmlns:a16="http://schemas.microsoft.com/office/drawing/2014/main" id="{7D9DF321-6AA7-7517-86EA-C97E051C320A}"/>
+                <a16:creationId xmlns:a16="http://schemas.microsoft.com/office/drawing/2014/main" id="{E48E01F9-AA4D-D08F-5A3F-21A53EE114D3}"/>
               </a:ext>
             </a:extLst>
           </p:cNvPr>
@@ -24731,8 +24731,8 @@
         </p:nvSpPr>
         <p:spPr>
           <a:xfrm>
-            <a:off x="886697" y="95167"/>
-            <a:ext cx="10515600" cy="1131471"/>
+            <a:off x="838200" y="210379"/>
+            <a:ext cx="10515600" cy="774358"/>
           </a:xfrm>
         </p:spPr>
         <p:txBody>
@@ -24741,3359 +24741,397 @@
           <a:p>
             <a:r>
               <a:rPr lang="en-US" dirty="0"/>
-              <a:t>Classification*</a:t>
+              <a:t>Confusion Matrix*</a:t>
             </a:r>
           </a:p>
         </p:txBody>
       </p:sp>
-      <p:grpSp>
-        <p:nvGrpSpPr>
-          <p:cNvPr id="112" name="Group 111">
+      <p:graphicFrame>
+        <p:nvGraphicFramePr>
+          <p:cNvPr id="4" name="Table 4">
             <a:extLst>
               <a:ext uri="{FF2B5EF4-FFF2-40B4-BE49-F238E27FC236}">
-                <a16:creationId xmlns:a16="http://schemas.microsoft.com/office/drawing/2014/main" id="{33CD28FA-42A2-78D1-4AC2-7B511533B211}"/>
+                <a16:creationId xmlns:a16="http://schemas.microsoft.com/office/drawing/2014/main" id="{10B15A79-0EEF-0377-7C97-F9BFF8E52D85}"/>
               </a:ext>
             </a:extLst>
           </p:cNvPr>
-          <p:cNvGrpSpPr/>
-          <p:nvPr/>
-        </p:nvGrpSpPr>
-        <p:grpSpPr>
-          <a:xfrm>
-            <a:off x="7667050" y="2574476"/>
-            <a:ext cx="2152665" cy="2528150"/>
-            <a:chOff x="4640482" y="2270780"/>
-            <a:chExt cx="2152665" cy="2528150"/>
-          </a:xfrm>
-        </p:grpSpPr>
-        <p:pic>
-          <p:nvPicPr>
-            <p:cNvPr id="113" name="Graphic 112" descr="Add with solid fill">
-              <a:extLst>
-                <a:ext uri="{FF2B5EF4-FFF2-40B4-BE49-F238E27FC236}">
-                  <a16:creationId xmlns:a16="http://schemas.microsoft.com/office/drawing/2014/main" id="{2D926DFF-7490-F14A-DFC8-E83990753BA5}"/>
-                </a:ext>
-              </a:extLst>
-            </p:cNvPr>
-            <p:cNvPicPr>
-              <a:picLocks noChangeAspect="1"/>
-            </p:cNvPicPr>
-            <p:nvPr/>
-          </p:nvPicPr>
-          <p:blipFill>
-            <a:blip r:embed="rId2">
-              <a:extLst>
-                <a:ext uri="{28A0092B-C50C-407E-A947-70E740481C1C}">
-                  <a14:useLocalDpi xmlns:a14="http://schemas.microsoft.com/office/drawing/2010/main" val="0"/>
-                </a:ext>
-                <a:ext uri="{96DAC541-7B7A-43D3-8B79-37D633B846F1}">
-                  <asvg:svgBlip xmlns:asvg="http://schemas.microsoft.com/office/drawing/2016/SVG/main" r:embed="rId3"/>
-                </a:ext>
-              </a:extLst>
-            </a:blip>
-            <a:stretch>
-              <a:fillRect/>
-            </a:stretch>
-          </p:blipFill>
-          <p:spPr>
-            <a:xfrm>
-              <a:off x="6215923" y="3202188"/>
-              <a:ext cx="180000" cy="180000"/>
-            </a:xfrm>
-            <a:prstGeom prst="rect">
-              <a:avLst/>
-            </a:prstGeom>
-          </p:spPr>
-        </p:pic>
-        <p:pic>
-          <p:nvPicPr>
-            <p:cNvPr id="114" name="Graphic 113" descr="Add with solid fill">
-              <a:extLst>
-                <a:ext uri="{FF2B5EF4-FFF2-40B4-BE49-F238E27FC236}">
-                  <a16:creationId xmlns:a16="http://schemas.microsoft.com/office/drawing/2014/main" id="{F5DC668A-5A33-3AD9-DFF3-E30DC3D87E66}"/>
-                </a:ext>
-              </a:extLst>
-            </p:cNvPr>
-            <p:cNvPicPr>
-              <a:picLocks noChangeAspect="1"/>
-            </p:cNvPicPr>
-            <p:nvPr/>
-          </p:nvPicPr>
-          <p:blipFill>
-            <a:blip r:embed="rId2">
-              <a:extLst>
-                <a:ext uri="{28A0092B-C50C-407E-A947-70E740481C1C}">
-                  <a14:useLocalDpi xmlns:a14="http://schemas.microsoft.com/office/drawing/2010/main" val="0"/>
-                </a:ext>
-                <a:ext uri="{96DAC541-7B7A-43D3-8B79-37D633B846F1}">
-                  <asvg:svgBlip xmlns:asvg="http://schemas.microsoft.com/office/drawing/2016/SVG/main" r:embed="rId3"/>
-                </a:ext>
-              </a:extLst>
-            </a:blip>
-            <a:stretch>
-              <a:fillRect/>
-            </a:stretch>
-          </p:blipFill>
-          <p:spPr>
-            <a:xfrm>
-              <a:off x="6328969" y="3403569"/>
-              <a:ext cx="180000" cy="180000"/>
-            </a:xfrm>
-            <a:prstGeom prst="rect">
-              <a:avLst/>
-            </a:prstGeom>
-          </p:spPr>
-        </p:pic>
-        <p:pic>
-          <p:nvPicPr>
-            <p:cNvPr id="115" name="Graphic 114" descr="Add with solid fill">
-              <a:extLst>
-                <a:ext uri="{FF2B5EF4-FFF2-40B4-BE49-F238E27FC236}">
-                  <a16:creationId xmlns:a16="http://schemas.microsoft.com/office/drawing/2014/main" id="{EEA67FB8-B294-5C9F-8060-3017B754833A}"/>
-                </a:ext>
-              </a:extLst>
-            </p:cNvPr>
-            <p:cNvPicPr>
-              <a:picLocks noChangeAspect="1"/>
-            </p:cNvPicPr>
-            <p:nvPr/>
-          </p:nvPicPr>
-          <p:blipFill>
-            <a:blip r:embed="rId4">
-              <a:extLst>
-                <a:ext uri="{28A0092B-C50C-407E-A947-70E740481C1C}">
-                  <a14:useLocalDpi xmlns:a14="http://schemas.microsoft.com/office/drawing/2010/main" val="0"/>
-                </a:ext>
-                <a:ext uri="{96DAC541-7B7A-43D3-8B79-37D633B846F1}">
-                  <asvg:svgBlip xmlns:asvg="http://schemas.microsoft.com/office/drawing/2016/SVG/main" r:embed="rId5"/>
-                </a:ext>
-              </a:extLst>
-            </a:blip>
-            <a:stretch>
-              <a:fillRect/>
-            </a:stretch>
-          </p:blipFill>
-          <p:spPr>
-            <a:xfrm>
-              <a:off x="4927689" y="3137343"/>
-              <a:ext cx="180000" cy="180000"/>
-            </a:xfrm>
-            <a:prstGeom prst="rect">
-              <a:avLst/>
-            </a:prstGeom>
-          </p:spPr>
-        </p:pic>
-        <p:pic>
-          <p:nvPicPr>
-            <p:cNvPr id="116" name="Graphic 115" descr="Add with solid fill">
-              <a:extLst>
-                <a:ext uri="{FF2B5EF4-FFF2-40B4-BE49-F238E27FC236}">
-                  <a16:creationId xmlns:a16="http://schemas.microsoft.com/office/drawing/2014/main" id="{66E79F51-6609-CB52-C652-D3150604496C}"/>
-                </a:ext>
-              </a:extLst>
-            </p:cNvPr>
-            <p:cNvPicPr>
-              <a:picLocks noChangeAspect="1"/>
-            </p:cNvPicPr>
-            <p:nvPr/>
-          </p:nvPicPr>
-          <p:blipFill>
-            <a:blip r:embed="rId4">
-              <a:extLst>
-                <a:ext uri="{28A0092B-C50C-407E-A947-70E740481C1C}">
-                  <a14:useLocalDpi xmlns:a14="http://schemas.microsoft.com/office/drawing/2010/main" val="0"/>
-                </a:ext>
-                <a:ext uri="{96DAC541-7B7A-43D3-8B79-37D633B846F1}">
-                  <asvg:svgBlip xmlns:asvg="http://schemas.microsoft.com/office/drawing/2016/SVG/main" r:embed="rId5"/>
-                </a:ext>
-              </a:extLst>
-            </a:blip>
-            <a:stretch>
-              <a:fillRect/>
-            </a:stretch>
-          </p:blipFill>
-          <p:spPr>
-            <a:xfrm>
-              <a:off x="5307148" y="2643719"/>
-              <a:ext cx="180000" cy="180000"/>
-            </a:xfrm>
-            <a:prstGeom prst="rect">
-              <a:avLst/>
-            </a:prstGeom>
-          </p:spPr>
-        </p:pic>
-        <p:pic>
-          <p:nvPicPr>
-            <p:cNvPr id="117" name="Graphic 116" descr="Add with solid fill">
-              <a:extLst>
-                <a:ext uri="{FF2B5EF4-FFF2-40B4-BE49-F238E27FC236}">
-                  <a16:creationId xmlns:a16="http://schemas.microsoft.com/office/drawing/2014/main" id="{20D1E9F7-4686-D5F4-7408-D61AF61A97CC}"/>
-                </a:ext>
-              </a:extLst>
-            </p:cNvPr>
-            <p:cNvPicPr>
-              <a:picLocks noChangeAspect="1"/>
-            </p:cNvPicPr>
-            <p:nvPr/>
-          </p:nvPicPr>
-          <p:blipFill>
-            <a:blip r:embed="rId4">
-              <a:extLst>
-                <a:ext uri="{28A0092B-C50C-407E-A947-70E740481C1C}">
-                  <a14:useLocalDpi xmlns:a14="http://schemas.microsoft.com/office/drawing/2010/main" val="0"/>
-                </a:ext>
-                <a:ext uri="{96DAC541-7B7A-43D3-8B79-37D633B846F1}">
-                  <asvg:svgBlip xmlns:asvg="http://schemas.microsoft.com/office/drawing/2016/SVG/main" r:embed="rId5"/>
-                </a:ext>
-              </a:extLst>
-            </a:blip>
-            <a:stretch>
-              <a:fillRect/>
-            </a:stretch>
-          </p:blipFill>
-          <p:spPr>
-            <a:xfrm>
-              <a:off x="5180948" y="3200597"/>
-              <a:ext cx="180000" cy="180000"/>
-            </a:xfrm>
-            <a:prstGeom prst="rect">
-              <a:avLst/>
-            </a:prstGeom>
-          </p:spPr>
-        </p:pic>
-        <p:pic>
-          <p:nvPicPr>
-            <p:cNvPr id="118" name="Graphic 117" descr="Add with solid fill">
-              <a:extLst>
-                <a:ext uri="{FF2B5EF4-FFF2-40B4-BE49-F238E27FC236}">
-                  <a16:creationId xmlns:a16="http://schemas.microsoft.com/office/drawing/2014/main" id="{0DF5F067-F2E6-9810-F6D6-3653B6745E36}"/>
-                </a:ext>
-              </a:extLst>
-            </p:cNvPr>
-            <p:cNvPicPr>
-              <a:picLocks noChangeAspect="1"/>
-            </p:cNvPicPr>
-            <p:nvPr/>
-          </p:nvPicPr>
-          <p:blipFill>
-            <a:blip r:embed="rId4">
-              <a:extLst>
-                <a:ext uri="{28A0092B-C50C-407E-A947-70E740481C1C}">
-                  <a14:useLocalDpi xmlns:a14="http://schemas.microsoft.com/office/drawing/2010/main" val="0"/>
-                </a:ext>
-                <a:ext uri="{96DAC541-7B7A-43D3-8B79-37D633B846F1}">
-                  <asvg:svgBlip xmlns:asvg="http://schemas.microsoft.com/office/drawing/2016/SVG/main" r:embed="rId5"/>
-                </a:ext>
-              </a:extLst>
-            </a:blip>
-            <a:stretch>
-              <a:fillRect/>
-            </a:stretch>
-          </p:blipFill>
-          <p:spPr>
-            <a:xfrm>
-              <a:off x="5804333" y="2621561"/>
-              <a:ext cx="180000" cy="180000"/>
-            </a:xfrm>
-            <a:prstGeom prst="rect">
-              <a:avLst/>
-            </a:prstGeom>
-          </p:spPr>
-        </p:pic>
-        <p:pic>
-          <p:nvPicPr>
-            <p:cNvPr id="119" name="Graphic 118" descr="Add with solid fill">
-              <a:extLst>
-                <a:ext uri="{FF2B5EF4-FFF2-40B4-BE49-F238E27FC236}">
-                  <a16:creationId xmlns:a16="http://schemas.microsoft.com/office/drawing/2014/main" id="{2DB93B2E-0F0B-F067-1604-D9B883098F01}"/>
-                </a:ext>
-              </a:extLst>
-            </p:cNvPr>
-            <p:cNvPicPr>
-              <a:picLocks noChangeAspect="1"/>
-            </p:cNvPicPr>
-            <p:nvPr/>
-          </p:nvPicPr>
-          <p:blipFill>
-            <a:blip r:embed="rId4">
-              <a:extLst>
-                <a:ext uri="{28A0092B-C50C-407E-A947-70E740481C1C}">
-                  <a14:useLocalDpi xmlns:a14="http://schemas.microsoft.com/office/drawing/2010/main" val="0"/>
-                </a:ext>
-                <a:ext uri="{96DAC541-7B7A-43D3-8B79-37D633B846F1}">
-                  <asvg:svgBlip xmlns:asvg="http://schemas.microsoft.com/office/drawing/2016/SVG/main" r:embed="rId5"/>
-                </a:ext>
-              </a:extLst>
-            </a:blip>
-            <a:stretch>
-              <a:fillRect/>
-            </a:stretch>
-          </p:blipFill>
-          <p:spPr>
-            <a:xfrm>
-              <a:off x="5947724" y="2384303"/>
-              <a:ext cx="180000" cy="180000"/>
-            </a:xfrm>
-            <a:prstGeom prst="rect">
-              <a:avLst/>
-            </a:prstGeom>
-          </p:spPr>
-        </p:pic>
-        <p:pic>
-          <p:nvPicPr>
-            <p:cNvPr id="120" name="Graphic 119" descr="Add with solid fill">
-              <a:extLst>
-                <a:ext uri="{FF2B5EF4-FFF2-40B4-BE49-F238E27FC236}">
-                  <a16:creationId xmlns:a16="http://schemas.microsoft.com/office/drawing/2014/main" id="{61A62C57-FE7A-D16A-6F05-901E84B0651C}"/>
-                </a:ext>
-              </a:extLst>
-            </p:cNvPr>
-            <p:cNvPicPr>
-              <a:picLocks noChangeAspect="1"/>
-            </p:cNvPicPr>
-            <p:nvPr/>
-          </p:nvPicPr>
-          <p:blipFill>
-            <a:blip r:embed="rId4">
-              <a:extLst>
-                <a:ext uri="{28A0092B-C50C-407E-A947-70E740481C1C}">
-                  <a14:useLocalDpi xmlns:a14="http://schemas.microsoft.com/office/drawing/2010/main" val="0"/>
-                </a:ext>
-                <a:ext uri="{96DAC541-7B7A-43D3-8B79-37D633B846F1}">
-                  <asvg:svgBlip xmlns:asvg="http://schemas.microsoft.com/office/drawing/2016/SVG/main" r:embed="rId5"/>
-                </a:ext>
-              </a:extLst>
-            </a:blip>
-            <a:stretch>
-              <a:fillRect/>
-            </a:stretch>
-          </p:blipFill>
-          <p:spPr>
-            <a:xfrm>
-              <a:off x="5346128" y="2395556"/>
-              <a:ext cx="180000" cy="180000"/>
-            </a:xfrm>
-            <a:prstGeom prst="rect">
-              <a:avLst/>
-            </a:prstGeom>
-          </p:spPr>
-        </p:pic>
-        <p:pic>
-          <p:nvPicPr>
-            <p:cNvPr id="121" name="Graphic 120" descr="Add with solid fill">
-              <a:extLst>
-                <a:ext uri="{FF2B5EF4-FFF2-40B4-BE49-F238E27FC236}">
-                  <a16:creationId xmlns:a16="http://schemas.microsoft.com/office/drawing/2014/main" id="{CFD2C97D-5B20-D8BB-6266-04C1E50988CA}"/>
-                </a:ext>
-              </a:extLst>
-            </p:cNvPr>
-            <p:cNvPicPr>
-              <a:picLocks noChangeAspect="1"/>
-            </p:cNvPicPr>
-            <p:nvPr/>
-          </p:nvPicPr>
-          <p:blipFill>
-            <a:blip r:embed="rId4">
-              <a:extLst>
-                <a:ext uri="{28A0092B-C50C-407E-A947-70E740481C1C}">
-                  <a14:useLocalDpi xmlns:a14="http://schemas.microsoft.com/office/drawing/2010/main" val="0"/>
-                </a:ext>
-                <a:ext uri="{96DAC541-7B7A-43D3-8B79-37D633B846F1}">
-                  <asvg:svgBlip xmlns:asvg="http://schemas.microsoft.com/office/drawing/2016/SVG/main" r:embed="rId5"/>
-                </a:ext>
-              </a:extLst>
-            </a:blip>
-            <a:stretch>
-              <a:fillRect/>
-            </a:stretch>
-          </p:blipFill>
-          <p:spPr>
-            <a:xfrm>
-              <a:off x="5641028" y="2480631"/>
-              <a:ext cx="180000" cy="180000"/>
-            </a:xfrm>
-            <a:prstGeom prst="rect">
-              <a:avLst/>
-            </a:prstGeom>
-          </p:spPr>
-        </p:pic>
-        <p:pic>
-          <p:nvPicPr>
-            <p:cNvPr id="122" name="Graphic 121" descr="Add with solid fill">
-              <a:extLst>
-                <a:ext uri="{FF2B5EF4-FFF2-40B4-BE49-F238E27FC236}">
-                  <a16:creationId xmlns:a16="http://schemas.microsoft.com/office/drawing/2014/main" id="{43018C86-B64A-EBE3-03BB-E7E931516626}"/>
-                </a:ext>
-              </a:extLst>
-            </p:cNvPr>
-            <p:cNvPicPr>
-              <a:picLocks noChangeAspect="1"/>
-            </p:cNvPicPr>
-            <p:nvPr/>
-          </p:nvPicPr>
-          <p:blipFill>
-            <a:blip r:embed="rId2">
-              <a:extLst>
-                <a:ext uri="{28A0092B-C50C-407E-A947-70E740481C1C}">
-                  <a14:useLocalDpi xmlns:a14="http://schemas.microsoft.com/office/drawing/2010/main" val="0"/>
-                </a:ext>
-                <a:ext uri="{96DAC541-7B7A-43D3-8B79-37D633B846F1}">
-                  <asvg:svgBlip xmlns:asvg="http://schemas.microsoft.com/office/drawing/2016/SVG/main" r:embed="rId3"/>
-                </a:ext>
-              </a:extLst>
-            </a:blip>
-            <a:stretch>
-              <a:fillRect/>
-            </a:stretch>
-          </p:blipFill>
-          <p:spPr>
-            <a:xfrm>
-              <a:off x="5406859" y="3971408"/>
-              <a:ext cx="180000" cy="180000"/>
-            </a:xfrm>
-            <a:prstGeom prst="rect">
-              <a:avLst/>
-            </a:prstGeom>
-          </p:spPr>
-        </p:pic>
-        <p:pic>
-          <p:nvPicPr>
-            <p:cNvPr id="123" name="Graphic 122" descr="Add with solid fill">
-              <a:extLst>
-                <a:ext uri="{FF2B5EF4-FFF2-40B4-BE49-F238E27FC236}">
-                  <a16:creationId xmlns:a16="http://schemas.microsoft.com/office/drawing/2014/main" id="{AB038D2B-1CAF-D6BD-5D9E-6DD0D157E987}"/>
-                </a:ext>
-              </a:extLst>
-            </p:cNvPr>
-            <p:cNvPicPr>
-              <a:picLocks noChangeAspect="1"/>
-            </p:cNvPicPr>
-            <p:nvPr/>
-          </p:nvPicPr>
-          <p:blipFill>
-            <a:blip r:embed="rId2">
-              <a:extLst>
-                <a:ext uri="{28A0092B-C50C-407E-A947-70E740481C1C}">
-                  <a14:useLocalDpi xmlns:a14="http://schemas.microsoft.com/office/drawing/2010/main" val="0"/>
-                </a:ext>
-                <a:ext uri="{96DAC541-7B7A-43D3-8B79-37D633B846F1}">
-                  <asvg:svgBlip xmlns:asvg="http://schemas.microsoft.com/office/drawing/2016/SVG/main" r:embed="rId3"/>
-                </a:ext>
-              </a:extLst>
-            </a:blip>
-            <a:stretch>
-              <a:fillRect/>
-            </a:stretch>
-          </p:blipFill>
-          <p:spPr>
-            <a:xfrm>
-              <a:off x="5804333" y="3982900"/>
-              <a:ext cx="180000" cy="180000"/>
-            </a:xfrm>
-            <a:prstGeom prst="rect">
-              <a:avLst/>
-            </a:prstGeom>
-          </p:spPr>
-        </p:pic>
-        <p:pic>
-          <p:nvPicPr>
-            <p:cNvPr id="124" name="Graphic 123" descr="Add with solid fill">
-              <a:extLst>
-                <a:ext uri="{FF2B5EF4-FFF2-40B4-BE49-F238E27FC236}">
-                  <a16:creationId xmlns:a16="http://schemas.microsoft.com/office/drawing/2014/main" id="{36E67E43-9C1F-63BD-54FD-5FDDD2F03BDD}"/>
-                </a:ext>
-              </a:extLst>
-            </p:cNvPr>
-            <p:cNvPicPr>
-              <a:picLocks noChangeAspect="1"/>
-            </p:cNvPicPr>
-            <p:nvPr/>
-          </p:nvPicPr>
-          <p:blipFill>
-            <a:blip r:embed="rId4">
-              <a:extLst>
-                <a:ext uri="{28A0092B-C50C-407E-A947-70E740481C1C}">
-                  <a14:useLocalDpi xmlns:a14="http://schemas.microsoft.com/office/drawing/2010/main" val="0"/>
-                </a:ext>
-                <a:ext uri="{96DAC541-7B7A-43D3-8B79-37D633B846F1}">
-                  <asvg:svgBlip xmlns:asvg="http://schemas.microsoft.com/office/drawing/2016/SVG/main" r:embed="rId5"/>
-                </a:ext>
-              </a:extLst>
-            </a:blip>
-            <a:stretch>
-              <a:fillRect/>
-            </a:stretch>
-          </p:blipFill>
-          <p:spPr>
-            <a:xfrm>
-              <a:off x="5391025" y="2915386"/>
-              <a:ext cx="180000" cy="180000"/>
-            </a:xfrm>
-            <a:prstGeom prst="rect">
-              <a:avLst/>
-            </a:prstGeom>
-          </p:spPr>
-        </p:pic>
-        <p:pic>
-          <p:nvPicPr>
-            <p:cNvPr id="125" name="Graphic 124" descr="Add with solid fill">
-              <a:extLst>
-                <a:ext uri="{FF2B5EF4-FFF2-40B4-BE49-F238E27FC236}">
-                  <a16:creationId xmlns:a16="http://schemas.microsoft.com/office/drawing/2014/main" id="{44204E69-88BE-B9A6-975F-ACE1DC6830AE}"/>
-                </a:ext>
-              </a:extLst>
-            </p:cNvPr>
-            <p:cNvPicPr>
-              <a:picLocks noChangeAspect="1"/>
-            </p:cNvPicPr>
-            <p:nvPr/>
-          </p:nvPicPr>
-          <p:blipFill>
-            <a:blip r:embed="rId4">
-              <a:extLst>
-                <a:ext uri="{28A0092B-C50C-407E-A947-70E740481C1C}">
-                  <a14:useLocalDpi xmlns:a14="http://schemas.microsoft.com/office/drawing/2010/main" val="0"/>
-                </a:ext>
-                <a:ext uri="{96DAC541-7B7A-43D3-8B79-37D633B846F1}">
-                  <asvg:svgBlip xmlns:asvg="http://schemas.microsoft.com/office/drawing/2016/SVG/main" r:embed="rId5"/>
-                </a:ext>
-              </a:extLst>
-            </a:blip>
-            <a:stretch>
-              <a:fillRect/>
-            </a:stretch>
-          </p:blipFill>
-          <p:spPr>
-            <a:xfrm>
-              <a:off x="4913004" y="3834649"/>
-              <a:ext cx="180000" cy="180000"/>
-            </a:xfrm>
-            <a:prstGeom prst="rect">
-              <a:avLst/>
-            </a:prstGeom>
-          </p:spPr>
-        </p:pic>
-        <p:pic>
-          <p:nvPicPr>
-            <p:cNvPr id="126" name="Graphic 125" descr="Add with solid fill">
-              <a:extLst>
-                <a:ext uri="{FF2B5EF4-FFF2-40B4-BE49-F238E27FC236}">
-                  <a16:creationId xmlns:a16="http://schemas.microsoft.com/office/drawing/2014/main" id="{C58B776A-53CE-A70E-DF26-B611BE82C8D0}"/>
-                </a:ext>
-              </a:extLst>
-            </p:cNvPr>
-            <p:cNvPicPr>
-              <a:picLocks noChangeAspect="1"/>
-            </p:cNvPicPr>
-            <p:nvPr/>
-          </p:nvPicPr>
-          <p:blipFill>
-            <a:blip r:embed="rId2">
-              <a:extLst>
-                <a:ext uri="{28A0092B-C50C-407E-A947-70E740481C1C}">
-                  <a14:useLocalDpi xmlns:a14="http://schemas.microsoft.com/office/drawing/2010/main" val="0"/>
-                </a:ext>
-                <a:ext uri="{96DAC541-7B7A-43D3-8B79-37D633B846F1}">
-                  <asvg:svgBlip xmlns:asvg="http://schemas.microsoft.com/office/drawing/2016/SVG/main" r:embed="rId3"/>
-                </a:ext>
-              </a:extLst>
-            </a:blip>
-            <a:stretch>
-              <a:fillRect/>
-            </a:stretch>
-          </p:blipFill>
-          <p:spPr>
-            <a:xfrm>
-              <a:off x="5427633" y="4487680"/>
-              <a:ext cx="180000" cy="180000"/>
-            </a:xfrm>
-            <a:prstGeom prst="rect">
-              <a:avLst/>
-            </a:prstGeom>
-          </p:spPr>
-        </p:pic>
-        <p:pic>
-          <p:nvPicPr>
-            <p:cNvPr id="127" name="Graphic 126" descr="Add with solid fill">
-              <a:extLst>
-                <a:ext uri="{FF2B5EF4-FFF2-40B4-BE49-F238E27FC236}">
-                  <a16:creationId xmlns:a16="http://schemas.microsoft.com/office/drawing/2014/main" id="{7554AE15-8C6D-2B91-31D5-3E36466AA62D}"/>
-                </a:ext>
-              </a:extLst>
-            </p:cNvPr>
-            <p:cNvPicPr>
-              <a:picLocks noChangeAspect="1"/>
-            </p:cNvPicPr>
-            <p:nvPr/>
-          </p:nvPicPr>
-          <p:blipFill>
-            <a:blip r:embed="rId2">
-              <a:extLst>
-                <a:ext uri="{28A0092B-C50C-407E-A947-70E740481C1C}">
-                  <a14:useLocalDpi xmlns:a14="http://schemas.microsoft.com/office/drawing/2010/main" val="0"/>
-                </a:ext>
-                <a:ext uri="{96DAC541-7B7A-43D3-8B79-37D633B846F1}">
-                  <asvg:svgBlip xmlns:asvg="http://schemas.microsoft.com/office/drawing/2016/SVG/main" r:embed="rId3"/>
-                </a:ext>
-              </a:extLst>
-            </a:blip>
-            <a:stretch>
-              <a:fillRect/>
-            </a:stretch>
-          </p:blipFill>
-          <p:spPr>
-            <a:xfrm>
-              <a:off x="5159113" y="4252908"/>
-              <a:ext cx="180000" cy="180000"/>
-            </a:xfrm>
-            <a:prstGeom prst="rect">
-              <a:avLst/>
-            </a:prstGeom>
-          </p:spPr>
-        </p:pic>
-        <p:pic>
-          <p:nvPicPr>
-            <p:cNvPr id="128" name="Graphic 127" descr="Add with solid fill">
-              <a:extLst>
-                <a:ext uri="{FF2B5EF4-FFF2-40B4-BE49-F238E27FC236}">
-                  <a16:creationId xmlns:a16="http://schemas.microsoft.com/office/drawing/2014/main" id="{DBD05C15-4ACC-0CFB-3319-D682AB38732C}"/>
-                </a:ext>
-              </a:extLst>
-            </p:cNvPr>
-            <p:cNvPicPr>
-              <a:picLocks noChangeAspect="1"/>
-            </p:cNvPicPr>
-            <p:nvPr/>
-          </p:nvPicPr>
-          <p:blipFill>
-            <a:blip r:embed="rId4">
-              <a:extLst>
-                <a:ext uri="{28A0092B-C50C-407E-A947-70E740481C1C}">
-                  <a14:useLocalDpi xmlns:a14="http://schemas.microsoft.com/office/drawing/2010/main" val="0"/>
-                </a:ext>
-                <a:ext uri="{96DAC541-7B7A-43D3-8B79-37D633B846F1}">
-                  <asvg:svgBlip xmlns:asvg="http://schemas.microsoft.com/office/drawing/2016/SVG/main" r:embed="rId5"/>
-                </a:ext>
-              </a:extLst>
-            </a:blip>
-            <a:stretch>
-              <a:fillRect/>
-            </a:stretch>
-          </p:blipFill>
-          <p:spPr>
-            <a:xfrm>
-              <a:off x="4770354" y="3370692"/>
-              <a:ext cx="180000" cy="180000"/>
-            </a:xfrm>
-            <a:prstGeom prst="rect">
-              <a:avLst/>
-            </a:prstGeom>
-          </p:spPr>
-        </p:pic>
-        <p:pic>
-          <p:nvPicPr>
-            <p:cNvPr id="129" name="Graphic 128" descr="Add with solid fill">
-              <a:extLst>
-                <a:ext uri="{FF2B5EF4-FFF2-40B4-BE49-F238E27FC236}">
-                  <a16:creationId xmlns:a16="http://schemas.microsoft.com/office/drawing/2014/main" id="{C45DF90F-E302-7B07-7077-D071421442E9}"/>
-                </a:ext>
-              </a:extLst>
-            </p:cNvPr>
-            <p:cNvPicPr>
-              <a:picLocks noChangeAspect="1"/>
-            </p:cNvPicPr>
-            <p:nvPr/>
-          </p:nvPicPr>
-          <p:blipFill>
-            <a:blip r:embed="rId4">
-              <a:extLst>
-                <a:ext uri="{28A0092B-C50C-407E-A947-70E740481C1C}">
-                  <a14:useLocalDpi xmlns:a14="http://schemas.microsoft.com/office/drawing/2010/main" val="0"/>
-                </a:ext>
-                <a:ext uri="{96DAC541-7B7A-43D3-8B79-37D633B846F1}">
-                  <asvg:svgBlip xmlns:asvg="http://schemas.microsoft.com/office/drawing/2016/SVG/main" r:embed="rId5"/>
-                </a:ext>
-              </a:extLst>
-            </a:blip>
-            <a:stretch>
-              <a:fillRect/>
-            </a:stretch>
-          </p:blipFill>
-          <p:spPr>
-            <a:xfrm>
-              <a:off x="5616176" y="2815666"/>
-              <a:ext cx="180000" cy="180000"/>
-            </a:xfrm>
-            <a:prstGeom prst="rect">
-              <a:avLst/>
-            </a:prstGeom>
-          </p:spPr>
-        </p:pic>
-        <p:pic>
-          <p:nvPicPr>
-            <p:cNvPr id="130" name="Graphic 129" descr="Add with solid fill">
-              <a:extLst>
-                <a:ext uri="{FF2B5EF4-FFF2-40B4-BE49-F238E27FC236}">
-                  <a16:creationId xmlns:a16="http://schemas.microsoft.com/office/drawing/2014/main" id="{41B48C29-EECD-C215-7E76-E89092BB4FAD}"/>
-                </a:ext>
-              </a:extLst>
-            </p:cNvPr>
-            <p:cNvPicPr>
-              <a:picLocks noChangeAspect="1"/>
-            </p:cNvPicPr>
-            <p:nvPr/>
-          </p:nvPicPr>
-          <p:blipFill>
-            <a:blip r:embed="rId4">
-              <a:extLst>
-                <a:ext uri="{28A0092B-C50C-407E-A947-70E740481C1C}">
-                  <a14:useLocalDpi xmlns:a14="http://schemas.microsoft.com/office/drawing/2010/main" val="0"/>
-                </a:ext>
-                <a:ext uri="{96DAC541-7B7A-43D3-8B79-37D633B846F1}">
-                  <asvg:svgBlip xmlns:asvg="http://schemas.microsoft.com/office/drawing/2016/SVG/main" r:embed="rId5"/>
-                </a:ext>
-              </a:extLst>
-            </a:blip>
-            <a:stretch>
-              <a:fillRect/>
-            </a:stretch>
-          </p:blipFill>
-          <p:spPr>
-            <a:xfrm>
-              <a:off x="4937742" y="3487396"/>
-              <a:ext cx="180000" cy="180000"/>
-            </a:xfrm>
-            <a:prstGeom prst="rect">
-              <a:avLst/>
-            </a:prstGeom>
-          </p:spPr>
-        </p:pic>
-        <p:pic>
-          <p:nvPicPr>
-            <p:cNvPr id="131" name="Graphic 130" descr="Add with solid fill">
-              <a:extLst>
-                <a:ext uri="{FF2B5EF4-FFF2-40B4-BE49-F238E27FC236}">
-                  <a16:creationId xmlns:a16="http://schemas.microsoft.com/office/drawing/2014/main" id="{9F588E43-E147-8B41-95DE-46ADE371ECF4}"/>
-                </a:ext>
-              </a:extLst>
-            </p:cNvPr>
-            <p:cNvPicPr>
-              <a:picLocks noChangeAspect="1"/>
-            </p:cNvPicPr>
-            <p:nvPr/>
-          </p:nvPicPr>
-          <p:blipFill>
-            <a:blip r:embed="rId2">
-              <a:extLst>
-                <a:ext uri="{28A0092B-C50C-407E-A947-70E740481C1C}">
-                  <a14:useLocalDpi xmlns:a14="http://schemas.microsoft.com/office/drawing/2010/main" val="0"/>
-                </a:ext>
-                <a:ext uri="{96DAC541-7B7A-43D3-8B79-37D633B846F1}">
-                  <asvg:svgBlip xmlns:asvg="http://schemas.microsoft.com/office/drawing/2016/SVG/main" r:embed="rId3"/>
-                </a:ext>
-              </a:extLst>
-            </a:blip>
-            <a:stretch>
-              <a:fillRect/>
-            </a:stretch>
-          </p:blipFill>
-          <p:spPr>
-            <a:xfrm>
-              <a:off x="6074333" y="3429000"/>
-              <a:ext cx="180000" cy="180000"/>
-            </a:xfrm>
-            <a:prstGeom prst="rect">
-              <a:avLst/>
-            </a:prstGeom>
-          </p:spPr>
-        </p:pic>
-        <p:pic>
-          <p:nvPicPr>
-            <p:cNvPr id="132" name="Graphic 131" descr="Add with solid fill">
-              <a:extLst>
-                <a:ext uri="{FF2B5EF4-FFF2-40B4-BE49-F238E27FC236}">
-                  <a16:creationId xmlns:a16="http://schemas.microsoft.com/office/drawing/2014/main" id="{FB240C40-8B7F-0C8A-9F80-C6AC6242C34C}"/>
-                </a:ext>
-              </a:extLst>
-            </p:cNvPr>
-            <p:cNvPicPr>
-              <a:picLocks noChangeAspect="1"/>
-            </p:cNvPicPr>
-            <p:nvPr/>
-          </p:nvPicPr>
-          <p:blipFill>
-            <a:blip r:embed="rId2">
-              <a:extLst>
-                <a:ext uri="{28A0092B-C50C-407E-A947-70E740481C1C}">
-                  <a14:useLocalDpi xmlns:a14="http://schemas.microsoft.com/office/drawing/2010/main" val="0"/>
-                </a:ext>
-                <a:ext uri="{96DAC541-7B7A-43D3-8B79-37D633B846F1}">
-                  <asvg:svgBlip xmlns:asvg="http://schemas.microsoft.com/office/drawing/2016/SVG/main" r:embed="rId3"/>
-                </a:ext>
-              </a:extLst>
-            </a:blip>
-            <a:stretch>
-              <a:fillRect/>
-            </a:stretch>
-          </p:blipFill>
-          <p:spPr>
-            <a:xfrm>
-              <a:off x="5634263" y="4272284"/>
-              <a:ext cx="180000" cy="180000"/>
-            </a:xfrm>
-            <a:prstGeom prst="rect">
-              <a:avLst/>
-            </a:prstGeom>
-          </p:spPr>
-        </p:pic>
-        <p:pic>
-          <p:nvPicPr>
-            <p:cNvPr id="133" name="Graphic 132" descr="Add with solid fill">
-              <a:extLst>
-                <a:ext uri="{FF2B5EF4-FFF2-40B4-BE49-F238E27FC236}">
-                  <a16:creationId xmlns:a16="http://schemas.microsoft.com/office/drawing/2014/main" id="{8EFF89B5-3F5A-4377-C6D2-B6958AB28063}"/>
-                </a:ext>
-              </a:extLst>
-            </p:cNvPr>
-            <p:cNvPicPr>
-              <a:picLocks noChangeAspect="1"/>
-            </p:cNvPicPr>
-            <p:nvPr/>
-          </p:nvPicPr>
-          <p:blipFill>
-            <a:blip r:embed="rId4">
-              <a:extLst>
-                <a:ext uri="{28A0092B-C50C-407E-A947-70E740481C1C}">
-                  <a14:useLocalDpi xmlns:a14="http://schemas.microsoft.com/office/drawing/2010/main" val="0"/>
-                </a:ext>
-                <a:ext uri="{96DAC541-7B7A-43D3-8B79-37D633B846F1}">
-                  <asvg:svgBlip xmlns:asvg="http://schemas.microsoft.com/office/drawing/2016/SVG/main" r:embed="rId5"/>
-                </a:ext>
-              </a:extLst>
-            </a:blip>
-            <a:stretch>
-              <a:fillRect/>
-            </a:stretch>
-          </p:blipFill>
-          <p:spPr>
-            <a:xfrm>
-              <a:off x="5127148" y="2871792"/>
-              <a:ext cx="180000" cy="180000"/>
-            </a:xfrm>
-            <a:prstGeom prst="rect">
-              <a:avLst/>
-            </a:prstGeom>
-          </p:spPr>
-        </p:pic>
-        <p:pic>
-          <p:nvPicPr>
-            <p:cNvPr id="134" name="Graphic 133" descr="Add with solid fill">
-              <a:extLst>
-                <a:ext uri="{FF2B5EF4-FFF2-40B4-BE49-F238E27FC236}">
-                  <a16:creationId xmlns:a16="http://schemas.microsoft.com/office/drawing/2014/main" id="{95B2D4A5-6E6F-8DF5-F2C4-FAA7C3253BE7}"/>
-                </a:ext>
-              </a:extLst>
-            </p:cNvPr>
-            <p:cNvPicPr>
-              <a:picLocks noChangeAspect="1"/>
-            </p:cNvPicPr>
-            <p:nvPr/>
-          </p:nvPicPr>
-          <p:blipFill>
-            <a:blip r:embed="rId2">
-              <a:extLst>
-                <a:ext uri="{28A0092B-C50C-407E-A947-70E740481C1C}">
-                  <a14:useLocalDpi xmlns:a14="http://schemas.microsoft.com/office/drawing/2010/main" val="0"/>
-                </a:ext>
-                <a:ext uri="{96DAC541-7B7A-43D3-8B79-37D633B846F1}">
-                  <asvg:svgBlip xmlns:asvg="http://schemas.microsoft.com/office/drawing/2016/SVG/main" r:embed="rId3"/>
-                </a:ext>
-              </a:extLst>
-            </a:blip>
-            <a:stretch>
-              <a:fillRect/>
-            </a:stretch>
-          </p:blipFill>
-          <p:spPr>
-            <a:xfrm>
-              <a:off x="5799056" y="3642240"/>
-              <a:ext cx="180000" cy="180000"/>
-            </a:xfrm>
-            <a:prstGeom prst="rect">
-              <a:avLst/>
-            </a:prstGeom>
-          </p:spPr>
-        </p:pic>
-        <p:pic>
-          <p:nvPicPr>
-            <p:cNvPr id="135" name="Graphic 134" descr="Add with solid fill">
-              <a:extLst>
-                <a:ext uri="{FF2B5EF4-FFF2-40B4-BE49-F238E27FC236}">
-                  <a16:creationId xmlns:a16="http://schemas.microsoft.com/office/drawing/2014/main" id="{EB5EAF6C-8C6B-E631-EDB8-77A735F9B34F}"/>
-                </a:ext>
-              </a:extLst>
-            </p:cNvPr>
-            <p:cNvPicPr>
-              <a:picLocks noChangeAspect="1"/>
-            </p:cNvPicPr>
-            <p:nvPr/>
-          </p:nvPicPr>
-          <p:blipFill>
-            <a:blip r:embed="rId2">
-              <a:extLst>
-                <a:ext uri="{28A0092B-C50C-407E-A947-70E740481C1C}">
-                  <a14:useLocalDpi xmlns:a14="http://schemas.microsoft.com/office/drawing/2010/main" val="0"/>
-                </a:ext>
-                <a:ext uri="{96DAC541-7B7A-43D3-8B79-37D633B846F1}">
-                  <asvg:svgBlip xmlns:asvg="http://schemas.microsoft.com/office/drawing/2016/SVG/main" r:embed="rId3"/>
-                </a:ext>
-              </a:extLst>
-            </a:blip>
-            <a:stretch>
-              <a:fillRect/>
-            </a:stretch>
-          </p:blipFill>
-          <p:spPr>
-            <a:xfrm>
-              <a:off x="5397148" y="4168631"/>
-              <a:ext cx="180000" cy="180000"/>
-            </a:xfrm>
-            <a:prstGeom prst="rect">
-              <a:avLst/>
-            </a:prstGeom>
-          </p:spPr>
-        </p:pic>
-        <p:pic>
-          <p:nvPicPr>
-            <p:cNvPr id="136" name="Graphic 135" descr="Add with solid fill">
-              <a:extLst>
-                <a:ext uri="{FF2B5EF4-FFF2-40B4-BE49-F238E27FC236}">
-                  <a16:creationId xmlns:a16="http://schemas.microsoft.com/office/drawing/2014/main" id="{3D7B3885-78EB-051E-FA63-CEA476A068A9}"/>
-                </a:ext>
-              </a:extLst>
-            </p:cNvPr>
-            <p:cNvPicPr>
-              <a:picLocks noChangeAspect="1"/>
-            </p:cNvPicPr>
-            <p:nvPr/>
-          </p:nvPicPr>
-          <p:blipFill>
-            <a:blip r:embed="rId2">
-              <a:extLst>
-                <a:ext uri="{28A0092B-C50C-407E-A947-70E740481C1C}">
-                  <a14:useLocalDpi xmlns:a14="http://schemas.microsoft.com/office/drawing/2010/main" val="0"/>
-                </a:ext>
-                <a:ext uri="{96DAC541-7B7A-43D3-8B79-37D633B846F1}">
-                  <asvg:svgBlip xmlns:asvg="http://schemas.microsoft.com/office/drawing/2016/SVG/main" r:embed="rId3"/>
-                </a:ext>
-              </a:extLst>
-            </a:blip>
-            <a:stretch>
-              <a:fillRect/>
-            </a:stretch>
-          </p:blipFill>
-          <p:spPr>
-            <a:xfrm>
-              <a:off x="4914881" y="4443667"/>
-              <a:ext cx="180000" cy="180000"/>
-            </a:xfrm>
-            <a:prstGeom prst="rect">
-              <a:avLst/>
-            </a:prstGeom>
-          </p:spPr>
-        </p:pic>
-        <p:pic>
-          <p:nvPicPr>
-            <p:cNvPr id="137" name="Graphic 136" descr="Add with solid fill">
-              <a:extLst>
-                <a:ext uri="{FF2B5EF4-FFF2-40B4-BE49-F238E27FC236}">
-                  <a16:creationId xmlns:a16="http://schemas.microsoft.com/office/drawing/2014/main" id="{E324E2E5-A0B3-80F1-350B-D070446AA505}"/>
-                </a:ext>
-              </a:extLst>
-            </p:cNvPr>
-            <p:cNvPicPr>
-              <a:picLocks noChangeAspect="1"/>
-            </p:cNvPicPr>
-            <p:nvPr/>
-          </p:nvPicPr>
-          <p:blipFill>
-            <a:blip r:embed="rId2">
-              <a:extLst>
-                <a:ext uri="{28A0092B-C50C-407E-A947-70E740481C1C}">
-                  <a14:useLocalDpi xmlns:a14="http://schemas.microsoft.com/office/drawing/2010/main" val="0"/>
-                </a:ext>
-                <a:ext uri="{96DAC541-7B7A-43D3-8B79-37D633B846F1}">
-                  <asvg:svgBlip xmlns:asvg="http://schemas.microsoft.com/office/drawing/2016/SVG/main" r:embed="rId3"/>
-                </a:ext>
-              </a:extLst>
-            </a:blip>
-            <a:stretch>
-              <a:fillRect/>
-            </a:stretch>
-          </p:blipFill>
-          <p:spPr>
-            <a:xfrm>
-              <a:off x="6176314" y="3754775"/>
-              <a:ext cx="180000" cy="180000"/>
-            </a:xfrm>
-            <a:prstGeom prst="rect">
-              <a:avLst/>
-            </a:prstGeom>
-          </p:spPr>
-        </p:pic>
-        <p:pic>
-          <p:nvPicPr>
-            <p:cNvPr id="138" name="Graphic 137" descr="Add with solid fill">
-              <a:extLst>
-                <a:ext uri="{FF2B5EF4-FFF2-40B4-BE49-F238E27FC236}">
-                  <a16:creationId xmlns:a16="http://schemas.microsoft.com/office/drawing/2014/main" id="{D7784BDE-DF61-C1E9-71F0-D48AA93A4E54}"/>
-                </a:ext>
-              </a:extLst>
-            </p:cNvPr>
-            <p:cNvPicPr>
-              <a:picLocks noChangeAspect="1"/>
-            </p:cNvPicPr>
-            <p:nvPr/>
-          </p:nvPicPr>
-          <p:blipFill>
-            <a:blip r:embed="rId2">
-              <a:extLst>
-                <a:ext uri="{28A0092B-C50C-407E-A947-70E740481C1C}">
-                  <a14:useLocalDpi xmlns:a14="http://schemas.microsoft.com/office/drawing/2010/main" val="0"/>
-                </a:ext>
-                <a:ext uri="{96DAC541-7B7A-43D3-8B79-37D633B846F1}">
-                  <asvg:svgBlip xmlns:asvg="http://schemas.microsoft.com/office/drawing/2016/SVG/main" r:embed="rId3"/>
-                </a:ext>
-              </a:extLst>
-            </a:blip>
-            <a:stretch>
-              <a:fillRect/>
-            </a:stretch>
-          </p:blipFill>
-          <p:spPr>
-            <a:xfrm>
-              <a:off x="5119169" y="4618930"/>
-              <a:ext cx="180000" cy="180000"/>
-            </a:xfrm>
-            <a:prstGeom prst="rect">
-              <a:avLst/>
-            </a:prstGeom>
-          </p:spPr>
-        </p:pic>
-        <p:pic>
-          <p:nvPicPr>
-            <p:cNvPr id="139" name="Graphic 138" descr="Add with solid fill">
-              <a:extLst>
-                <a:ext uri="{FF2B5EF4-FFF2-40B4-BE49-F238E27FC236}">
-                  <a16:creationId xmlns:a16="http://schemas.microsoft.com/office/drawing/2014/main" id="{DBDB2AFF-7396-4081-C34D-29A5CB2866FE}"/>
-                </a:ext>
-              </a:extLst>
-            </p:cNvPr>
-            <p:cNvPicPr>
-              <a:picLocks noChangeAspect="1"/>
-            </p:cNvPicPr>
-            <p:nvPr/>
-          </p:nvPicPr>
-          <p:blipFill>
-            <a:blip r:embed="rId2">
-              <a:extLst>
-                <a:ext uri="{28A0092B-C50C-407E-A947-70E740481C1C}">
-                  <a14:useLocalDpi xmlns:a14="http://schemas.microsoft.com/office/drawing/2010/main" val="0"/>
-                </a:ext>
-                <a:ext uri="{96DAC541-7B7A-43D3-8B79-37D633B846F1}">
-                  <asvg:svgBlip xmlns:asvg="http://schemas.microsoft.com/office/drawing/2016/SVG/main" r:embed="rId3"/>
-                </a:ext>
-              </a:extLst>
-            </a:blip>
-            <a:stretch>
-              <a:fillRect/>
-            </a:stretch>
-          </p:blipFill>
-          <p:spPr>
-            <a:xfrm>
-              <a:off x="5566671" y="3826645"/>
-              <a:ext cx="180000" cy="180000"/>
-            </a:xfrm>
-            <a:prstGeom prst="rect">
-              <a:avLst/>
-            </a:prstGeom>
-          </p:spPr>
-        </p:pic>
-        <p:pic>
-          <p:nvPicPr>
-            <p:cNvPr id="140" name="Graphic 139" descr="Add with solid fill">
-              <a:extLst>
-                <a:ext uri="{FF2B5EF4-FFF2-40B4-BE49-F238E27FC236}">
-                  <a16:creationId xmlns:a16="http://schemas.microsoft.com/office/drawing/2014/main" id="{D62115C6-4C3A-77FE-1B96-0F54180DE8BD}"/>
-                </a:ext>
-              </a:extLst>
-            </p:cNvPr>
-            <p:cNvPicPr>
-              <a:picLocks noChangeAspect="1"/>
-            </p:cNvPicPr>
-            <p:nvPr/>
-          </p:nvPicPr>
-          <p:blipFill>
-            <a:blip r:embed="rId2">
-              <a:extLst>
-                <a:ext uri="{28A0092B-C50C-407E-A947-70E740481C1C}">
-                  <a14:useLocalDpi xmlns:a14="http://schemas.microsoft.com/office/drawing/2010/main" val="0"/>
-                </a:ext>
-                <a:ext uri="{96DAC541-7B7A-43D3-8B79-37D633B846F1}">
-                  <asvg:svgBlip xmlns:asvg="http://schemas.microsoft.com/office/drawing/2016/SVG/main" r:embed="rId3"/>
-                </a:ext>
-              </a:extLst>
-            </a:blip>
-            <a:stretch>
-              <a:fillRect/>
-            </a:stretch>
-          </p:blipFill>
-          <p:spPr>
-            <a:xfrm>
-              <a:off x="6613147" y="2833108"/>
-              <a:ext cx="180000" cy="180000"/>
-            </a:xfrm>
-            <a:prstGeom prst="rect">
-              <a:avLst/>
-            </a:prstGeom>
-          </p:spPr>
-        </p:pic>
-        <p:pic>
-          <p:nvPicPr>
-            <p:cNvPr id="141" name="Graphic 140" descr="Add with solid fill">
-              <a:extLst>
-                <a:ext uri="{FF2B5EF4-FFF2-40B4-BE49-F238E27FC236}">
-                  <a16:creationId xmlns:a16="http://schemas.microsoft.com/office/drawing/2014/main" id="{2B1FF51C-2918-14DB-18A8-1E9A45B74DBE}"/>
-                </a:ext>
-              </a:extLst>
-            </p:cNvPr>
-            <p:cNvPicPr>
-              <a:picLocks noChangeAspect="1"/>
-            </p:cNvPicPr>
-            <p:nvPr/>
-          </p:nvPicPr>
-          <p:blipFill>
-            <a:blip r:embed="rId2">
-              <a:extLst>
-                <a:ext uri="{28A0092B-C50C-407E-A947-70E740481C1C}">
-                  <a14:useLocalDpi xmlns:a14="http://schemas.microsoft.com/office/drawing/2010/main" val="0"/>
-                </a:ext>
-                <a:ext uri="{96DAC541-7B7A-43D3-8B79-37D633B846F1}">
-                  <asvg:svgBlip xmlns:asvg="http://schemas.microsoft.com/office/drawing/2016/SVG/main" r:embed="rId3"/>
-                </a:ext>
-              </a:extLst>
-            </a:blip>
-            <a:stretch>
-              <a:fillRect/>
-            </a:stretch>
-          </p:blipFill>
-          <p:spPr>
-            <a:xfrm>
-              <a:off x="5996314" y="3714940"/>
-              <a:ext cx="180000" cy="180000"/>
-            </a:xfrm>
-            <a:prstGeom prst="rect">
-              <a:avLst/>
-            </a:prstGeom>
-          </p:spPr>
-        </p:pic>
-        <p:pic>
-          <p:nvPicPr>
-            <p:cNvPr id="142" name="Graphic 141" descr="Add with solid fill">
-              <a:extLst>
-                <a:ext uri="{FF2B5EF4-FFF2-40B4-BE49-F238E27FC236}">
-                  <a16:creationId xmlns:a16="http://schemas.microsoft.com/office/drawing/2014/main" id="{3E81DE1D-7AC6-6C35-E7B7-8740F15735D4}"/>
-                </a:ext>
-              </a:extLst>
-            </p:cNvPr>
-            <p:cNvPicPr>
-              <a:picLocks noChangeAspect="1"/>
-            </p:cNvPicPr>
-            <p:nvPr/>
-          </p:nvPicPr>
-          <p:blipFill>
-            <a:blip r:embed="rId4">
-              <a:extLst>
-                <a:ext uri="{28A0092B-C50C-407E-A947-70E740481C1C}">
-                  <a14:useLocalDpi xmlns:a14="http://schemas.microsoft.com/office/drawing/2010/main" val="0"/>
-                </a:ext>
-                <a:ext uri="{96DAC541-7B7A-43D3-8B79-37D633B846F1}">
-                  <asvg:svgBlip xmlns:asvg="http://schemas.microsoft.com/office/drawing/2016/SVG/main" r:embed="rId5"/>
-                </a:ext>
-              </a:extLst>
-            </a:blip>
-            <a:stretch>
-              <a:fillRect/>
-            </a:stretch>
-          </p:blipFill>
-          <p:spPr>
-            <a:xfrm>
-              <a:off x="4640482" y="3720418"/>
-              <a:ext cx="180000" cy="180000"/>
-            </a:xfrm>
-            <a:prstGeom prst="rect">
-              <a:avLst/>
-            </a:prstGeom>
-          </p:spPr>
-        </p:pic>
-        <p:pic>
-          <p:nvPicPr>
-            <p:cNvPr id="143" name="Graphic 142" descr="Add with solid fill">
-              <a:extLst>
-                <a:ext uri="{FF2B5EF4-FFF2-40B4-BE49-F238E27FC236}">
-                  <a16:creationId xmlns:a16="http://schemas.microsoft.com/office/drawing/2014/main" id="{6852E6B1-4BD3-C801-5B5F-6D68F03D5631}"/>
-                </a:ext>
-              </a:extLst>
-            </p:cNvPr>
-            <p:cNvPicPr>
-              <a:picLocks noChangeAspect="1"/>
-            </p:cNvPicPr>
-            <p:nvPr/>
-          </p:nvPicPr>
-          <p:blipFill>
-            <a:blip r:embed="rId4">
-              <a:extLst>
-                <a:ext uri="{28A0092B-C50C-407E-A947-70E740481C1C}">
-                  <a14:useLocalDpi xmlns:a14="http://schemas.microsoft.com/office/drawing/2010/main" val="0"/>
-                </a:ext>
-                <a:ext uri="{96DAC541-7B7A-43D3-8B79-37D633B846F1}">
-                  <asvg:svgBlip xmlns:asvg="http://schemas.microsoft.com/office/drawing/2016/SVG/main" r:embed="rId5"/>
-                </a:ext>
-              </a:extLst>
-            </a:blip>
-            <a:stretch>
-              <a:fillRect/>
-            </a:stretch>
-          </p:blipFill>
-          <p:spPr>
-            <a:xfrm>
-              <a:off x="5727499" y="2270780"/>
-              <a:ext cx="180000" cy="180000"/>
-            </a:xfrm>
-            <a:prstGeom prst="rect">
-              <a:avLst/>
-            </a:prstGeom>
-          </p:spPr>
-        </p:pic>
-        <p:pic>
-          <p:nvPicPr>
-            <p:cNvPr id="144" name="Graphic 143" descr="Add with solid fill">
-              <a:extLst>
-                <a:ext uri="{FF2B5EF4-FFF2-40B4-BE49-F238E27FC236}">
-                  <a16:creationId xmlns:a16="http://schemas.microsoft.com/office/drawing/2014/main" id="{FAAF0FD6-222D-DC39-9C9E-3B1BF2B4021C}"/>
-                </a:ext>
-              </a:extLst>
-            </p:cNvPr>
-            <p:cNvPicPr>
-              <a:picLocks noChangeAspect="1"/>
-            </p:cNvPicPr>
-            <p:nvPr/>
-          </p:nvPicPr>
-          <p:blipFill>
-            <a:blip r:embed="rId2">
-              <a:extLst>
-                <a:ext uri="{28A0092B-C50C-407E-A947-70E740481C1C}">
-                  <a14:useLocalDpi xmlns:a14="http://schemas.microsoft.com/office/drawing/2010/main" val="0"/>
-                </a:ext>
-                <a:ext uri="{96DAC541-7B7A-43D3-8B79-37D633B846F1}">
-                  <asvg:svgBlip xmlns:asvg="http://schemas.microsoft.com/office/drawing/2016/SVG/main" r:embed="rId3"/>
-                </a:ext>
-              </a:extLst>
-            </a:blip>
-            <a:stretch>
-              <a:fillRect/>
-            </a:stretch>
-          </p:blipFill>
-          <p:spPr>
-            <a:xfrm>
-              <a:off x="6379839" y="2945176"/>
-              <a:ext cx="180000" cy="180000"/>
-            </a:xfrm>
-            <a:prstGeom prst="rect">
-              <a:avLst/>
-            </a:prstGeom>
-          </p:spPr>
-        </p:pic>
-        <p:pic>
-          <p:nvPicPr>
-            <p:cNvPr id="145" name="Graphic 144" descr="Add with solid fill">
-              <a:extLst>
-                <a:ext uri="{FF2B5EF4-FFF2-40B4-BE49-F238E27FC236}">
-                  <a16:creationId xmlns:a16="http://schemas.microsoft.com/office/drawing/2014/main" id="{3A038015-4902-9DFC-62C8-F1225E092529}"/>
-                </a:ext>
-              </a:extLst>
-            </p:cNvPr>
-            <p:cNvPicPr>
-              <a:picLocks noChangeAspect="1"/>
-            </p:cNvPicPr>
-            <p:nvPr/>
-          </p:nvPicPr>
-          <p:blipFill>
-            <a:blip r:embed="rId2">
-              <a:extLst>
-                <a:ext uri="{28A0092B-C50C-407E-A947-70E740481C1C}">
-                  <a14:useLocalDpi xmlns:a14="http://schemas.microsoft.com/office/drawing/2010/main" val="0"/>
-                </a:ext>
-                <a:ext uri="{96DAC541-7B7A-43D3-8B79-37D633B846F1}">
-                  <asvg:svgBlip xmlns:asvg="http://schemas.microsoft.com/office/drawing/2016/SVG/main" r:embed="rId3"/>
-                </a:ext>
-              </a:extLst>
-            </a:blip>
-            <a:stretch>
-              <a:fillRect/>
-            </a:stretch>
-          </p:blipFill>
-          <p:spPr>
-            <a:xfrm>
-              <a:off x="6500968" y="3149127"/>
-              <a:ext cx="180000" cy="180000"/>
-            </a:xfrm>
-            <a:prstGeom prst="rect">
-              <a:avLst/>
-            </a:prstGeom>
-          </p:spPr>
-        </p:pic>
-      </p:grpSp>
-      <p:grpSp>
-        <p:nvGrpSpPr>
-          <p:cNvPr id="166" name="Group 165">
-            <a:extLst>
-              <a:ext uri="{FF2B5EF4-FFF2-40B4-BE49-F238E27FC236}">
-                <a16:creationId xmlns:a16="http://schemas.microsoft.com/office/drawing/2014/main" id="{7461D725-9EC8-9C6C-DC62-DEF0064615B5}"/>
-              </a:ext>
-            </a:extLst>
-          </p:cNvPr>
-          <p:cNvGrpSpPr/>
-          <p:nvPr/>
-        </p:nvGrpSpPr>
-        <p:grpSpPr>
-          <a:xfrm>
-            <a:off x="232553" y="1403076"/>
-            <a:ext cx="11666292" cy="4989885"/>
-            <a:chOff x="246621" y="1374942"/>
-            <a:chExt cx="11666292" cy="4989885"/>
-          </a:xfrm>
-        </p:grpSpPr>
-        <p:grpSp>
-          <p:nvGrpSpPr>
-            <p:cNvPr id="67" name="Group 66">
-              <a:extLst>
-                <a:ext uri="{FF2B5EF4-FFF2-40B4-BE49-F238E27FC236}">
-                  <a16:creationId xmlns:a16="http://schemas.microsoft.com/office/drawing/2014/main" id="{2320A717-8560-ECBC-2652-67C131E2B99A}"/>
-                </a:ext>
-              </a:extLst>
-            </p:cNvPr>
-            <p:cNvGrpSpPr/>
-            <p:nvPr/>
-          </p:nvGrpSpPr>
-          <p:grpSpPr>
-            <a:xfrm>
-              <a:off x="1575090" y="2336383"/>
-              <a:ext cx="2571786" cy="2967178"/>
-              <a:chOff x="4490246" y="2227289"/>
-              <a:chExt cx="2571786" cy="2967178"/>
-            </a:xfrm>
-          </p:grpSpPr>
-          <p:pic>
-            <p:nvPicPr>
-              <p:cNvPr id="32" name="Graphic 31" descr="Add with solid fill">
+          <p:cNvGraphicFramePr>
+            <a:graphicFrameLocks noGrp="1"/>
+          </p:cNvGraphicFramePr>
+          <p:nvPr>
+            <p:extLst>
+              <p:ext uri="{D42A27DB-BD31-4B8C-83A1-F6EECF244321}">
+                <p14:modId xmlns:p14="http://schemas.microsoft.com/office/powerpoint/2010/main" val="3642435680"/>
+              </p:ext>
+            </p:extLst>
+          </p:nvPr>
+        </p:nvGraphicFramePr>
+        <p:xfrm>
+          <a:off x="3054252" y="1313766"/>
+          <a:ext cx="5492652" cy="4448519"/>
+        </p:xfrm>
+        <a:graphic>
+          <a:graphicData uri="http://schemas.openxmlformats.org/drawingml/2006/table">
+            <a:tbl>
+              <a:tblPr firstRow="1" bandRow="1">
+                <a:tableStyleId>{5C22544A-7EE6-4342-B048-85BDC9FD1C3A}</a:tableStyleId>
+              </a:tblPr>
+              <a:tblGrid>
+                <a:gridCol w="1211816">
+                  <a:extLst>
+                    <a:ext uri="{9D8B030D-6E8A-4147-A177-3AD203B41FA5}">
+                      <a16:colId xmlns:a16="http://schemas.microsoft.com/office/drawing/2014/main" val="1347266415"/>
+                    </a:ext>
+                  </a:extLst>
+                </a:gridCol>
+                <a:gridCol w="619068">
+                  <a:extLst>
+                    <a:ext uri="{9D8B030D-6E8A-4147-A177-3AD203B41FA5}">
+                      <a16:colId xmlns:a16="http://schemas.microsoft.com/office/drawing/2014/main" val="1928021981"/>
+                    </a:ext>
+                  </a:extLst>
+                </a:gridCol>
+                <a:gridCol w="1830884">
+                  <a:extLst>
+                    <a:ext uri="{9D8B030D-6E8A-4147-A177-3AD203B41FA5}">
+                      <a16:colId xmlns:a16="http://schemas.microsoft.com/office/drawing/2014/main" val="1875599576"/>
+                    </a:ext>
+                  </a:extLst>
+                </a:gridCol>
+                <a:gridCol w="1830884">
+                  <a:extLst>
+                    <a:ext uri="{9D8B030D-6E8A-4147-A177-3AD203B41FA5}">
+                      <a16:colId xmlns:a16="http://schemas.microsoft.com/office/drawing/2014/main" val="1749498856"/>
+                    </a:ext>
+                  </a:extLst>
+                </a:gridCol>
+              </a:tblGrid>
+              <a:tr h="979269">
+                <a:tc rowSpan="2" gridSpan="2">
+                  <a:txBody>
+                    <a:bodyPr/>
+                    <a:lstStyle/>
+                    <a:p>
+                      <a:endParaRPr lang="en-US" dirty="0"/>
+                    </a:p>
+                  </a:txBody>
+                  <a:tcPr>
+                    <a:solidFill>
+                      <a:schemeClr val="bg1"/>
+                    </a:solidFill>
+                  </a:tcPr>
+                </a:tc>
+                <a:tc rowSpan="2" hMerge="1">
+                  <a:txBody>
+                    <a:bodyPr/>
+                    <a:lstStyle/>
+                    <a:p>
+                      <a:endParaRPr lang="en-US"/>
+                    </a:p>
+                  </a:txBody>
+                  <a:tcPr/>
+                </a:tc>
+                <a:tc gridSpan="2">
+                  <a:txBody>
+                    <a:bodyPr/>
+                    <a:lstStyle/>
+                    <a:p>
+                      <a:pPr algn="ctr"/>
+                      <a:r>
+                        <a:rPr lang="en-US" dirty="0"/>
+                        <a:t>Actual Values</a:t>
+                      </a:r>
+                    </a:p>
+                  </a:txBody>
+                  <a:tcPr anchor="ctr"/>
+                </a:tc>
+                <a:tc hMerge="1">
+                  <a:txBody>
+                    <a:bodyPr/>
+                    <a:lstStyle/>
+                    <a:p>
+                      <a:pPr algn="ctr"/>
+                      <a:endParaRPr lang="en-US" dirty="0"/>
+                    </a:p>
+                  </a:txBody>
+                  <a:tcPr anchor="ctr"/>
+                </a:tc>
                 <a:extLst>
-                  <a:ext uri="{FF2B5EF4-FFF2-40B4-BE49-F238E27FC236}">
-                    <a16:creationId xmlns:a16="http://schemas.microsoft.com/office/drawing/2014/main" id="{834941D9-4353-9D1A-0DFF-85730A89CB35}"/>
+                  <a:ext uri="{0D108BD9-81ED-4DB2-BD59-A6C34878D82A}">
+                    <a16:rowId xmlns:a16="http://schemas.microsoft.com/office/drawing/2014/main" val="2469773159"/>
                   </a:ext>
                 </a:extLst>
-              </p:cNvPr>
-              <p:cNvPicPr>
-                <a:picLocks noChangeAspect="1"/>
-              </p:cNvPicPr>
-              <p:nvPr/>
-            </p:nvPicPr>
-            <p:blipFill>
-              <a:blip r:embed="rId6">
+              </a:tr>
+              <a:tr h="464234">
+                <a:tc gridSpan="2" vMerge="1">
+                  <a:txBody>
+                    <a:bodyPr/>
+                    <a:lstStyle/>
+                    <a:p>
+                      <a:endParaRPr lang="en-US"/>
+                    </a:p>
+                  </a:txBody>
+                  <a:tcPr/>
+                </a:tc>
+                <a:tc hMerge="1" vMerge="1">
+                  <a:txBody>
+                    <a:bodyPr/>
+                    <a:lstStyle/>
+                    <a:p>
+                      <a:endParaRPr lang="en-US"/>
+                    </a:p>
+                  </a:txBody>
+                  <a:tcPr/>
+                </a:tc>
+                <a:tc>
+                  <a:txBody>
+                    <a:bodyPr/>
+                    <a:lstStyle/>
+                    <a:p>
+                      <a:pPr algn="ctr"/>
+                      <a:r>
+                        <a:rPr lang="en-US" b="1" dirty="0">
+                          <a:solidFill>
+                            <a:schemeClr val="bg1"/>
+                          </a:solidFill>
+                        </a:rPr>
+                        <a:t>Positive</a:t>
+                      </a:r>
+                    </a:p>
+                  </a:txBody>
+                  <a:tcPr anchor="ctr">
+                    <a:solidFill>
+                      <a:schemeClr val="accent1"/>
+                    </a:solidFill>
+                  </a:tcPr>
+                </a:tc>
+                <a:tc>
+                  <a:txBody>
+                    <a:bodyPr/>
+                    <a:lstStyle/>
+                    <a:p>
+                      <a:pPr algn="ctr"/>
+                      <a:r>
+                        <a:rPr lang="en-US" b="1" dirty="0">
+                          <a:solidFill>
+                            <a:schemeClr val="bg1"/>
+                          </a:solidFill>
+                        </a:rPr>
+                        <a:t>Negative</a:t>
+                      </a:r>
+                    </a:p>
+                  </a:txBody>
+                  <a:tcPr anchor="ctr">
+                    <a:solidFill>
+                      <a:schemeClr val="accent1"/>
+                    </a:solidFill>
+                  </a:tcPr>
+                </a:tc>
                 <a:extLst>
-                  <a:ext uri="{28A0092B-C50C-407E-A947-70E740481C1C}">
-                    <a14:useLocalDpi xmlns:a14="http://schemas.microsoft.com/office/drawing/2010/main" val="0"/>
-                  </a:ext>
-                  <a:ext uri="{96DAC541-7B7A-43D3-8B79-37D633B846F1}">
-                    <asvg:svgBlip xmlns:asvg="http://schemas.microsoft.com/office/drawing/2016/SVG/main" r:embed="rId7"/>
+                  <a:ext uri="{0D108BD9-81ED-4DB2-BD59-A6C34878D82A}">
+                    <a16:rowId xmlns:a16="http://schemas.microsoft.com/office/drawing/2014/main" val="2740677284"/>
                   </a:ext>
                 </a:extLst>
-              </a:blip>
-              <a:stretch>
-                <a:fillRect/>
-              </a:stretch>
-            </p:blipFill>
-            <p:spPr>
-              <a:xfrm>
-                <a:off x="6252598" y="3089576"/>
-                <a:ext cx="180000" cy="180000"/>
-              </a:xfrm>
-              <a:prstGeom prst="rect">
-                <a:avLst/>
-              </a:prstGeom>
-            </p:spPr>
-          </p:pic>
-          <p:pic>
-            <p:nvPicPr>
-              <p:cNvPr id="33" name="Graphic 32" descr="Add with solid fill">
+              </a:tr>
+              <a:tr h="1502508">
+                <a:tc rowSpan="2">
+                  <a:txBody>
+                    <a:bodyPr/>
+                    <a:lstStyle/>
+                    <a:p>
+                      <a:pPr marL="0" algn="ctr" defTabSz="914400" rtl="0" eaLnBrk="1" latinLnBrk="0" hangingPunct="1"/>
+                      <a:r>
+                        <a:rPr lang="en-US" sz="1800" b="1" kern="1200" dirty="0">
+                          <a:solidFill>
+                            <a:schemeClr val="lt1"/>
+                          </a:solidFill>
+                          <a:latin typeface="+mn-lt"/>
+                          <a:ea typeface="+mn-ea"/>
+                          <a:cs typeface="+mn-cs"/>
+                        </a:rPr>
+                        <a:t>Predicted Values</a:t>
+                      </a:r>
+                    </a:p>
+                  </a:txBody>
+                  <a:tcPr anchor="ctr">
+                    <a:solidFill>
+                      <a:schemeClr val="accent1"/>
+                    </a:solidFill>
+                  </a:tcPr>
+                </a:tc>
+                <a:tc>
+                  <a:txBody>
+                    <a:bodyPr/>
+                    <a:lstStyle/>
+                    <a:p>
+                      <a:pPr marL="0" algn="ctr" defTabSz="914400" rtl="0" eaLnBrk="1" latinLnBrk="0" hangingPunct="1"/>
+                      <a:r>
+                        <a:rPr lang="en-US" sz="1800" b="1" kern="1200" dirty="0">
+                          <a:solidFill>
+                            <a:schemeClr val="lt1"/>
+                          </a:solidFill>
+                          <a:latin typeface="+mn-lt"/>
+                          <a:ea typeface="+mn-ea"/>
+                          <a:cs typeface="+mn-cs"/>
+                        </a:rPr>
+                        <a:t>Positive</a:t>
+                      </a:r>
+                    </a:p>
+                  </a:txBody>
+                  <a:tcPr vert="vert270" anchor="ctr">
+                    <a:solidFill>
+                      <a:schemeClr val="accent1"/>
+                    </a:solidFill>
+                  </a:tcPr>
+                </a:tc>
+                <a:tc>
+                  <a:txBody>
+                    <a:bodyPr/>
+                    <a:lstStyle/>
+                    <a:p>
+                      <a:pPr algn="ctr"/>
+                      <a:r>
+                        <a:rPr lang="en-US" b="1" dirty="0"/>
+                        <a:t>True Positive</a:t>
+                      </a:r>
+                    </a:p>
+                  </a:txBody>
+                  <a:tcPr anchor="ctr">
+                    <a:solidFill>
+                      <a:schemeClr val="bg1">
+                        <a:lumMod val="85000"/>
+                      </a:schemeClr>
+                    </a:solidFill>
+                  </a:tcPr>
+                </a:tc>
+                <a:tc>
+                  <a:txBody>
+                    <a:bodyPr/>
+                    <a:lstStyle/>
+                    <a:p>
+                      <a:pPr algn="ctr"/>
+                      <a:r>
+                        <a:rPr lang="en-US" b="1" dirty="0"/>
+                        <a:t>False Positive</a:t>
+                      </a:r>
+                    </a:p>
+                  </a:txBody>
+                  <a:tcPr anchor="ctr">
+                    <a:solidFill>
+                      <a:schemeClr val="bg1">
+                        <a:lumMod val="85000"/>
+                      </a:schemeClr>
+                    </a:solidFill>
+                  </a:tcPr>
+                </a:tc>
                 <a:extLst>
-                  <a:ext uri="{FF2B5EF4-FFF2-40B4-BE49-F238E27FC236}">
-                    <a16:creationId xmlns:a16="http://schemas.microsoft.com/office/drawing/2014/main" id="{802603E0-74D8-2A86-371A-024FE6DB26F8}"/>
+                  <a:ext uri="{0D108BD9-81ED-4DB2-BD59-A6C34878D82A}">
+                    <a16:rowId xmlns:a16="http://schemas.microsoft.com/office/drawing/2014/main" val="177994405"/>
                   </a:ext>
                 </a:extLst>
-              </p:cNvPr>
-              <p:cNvPicPr>
-                <a:picLocks noChangeAspect="1"/>
-              </p:cNvPicPr>
-              <p:nvPr/>
-            </p:nvPicPr>
-            <p:blipFill>
-              <a:blip r:embed="rId6">
+              </a:tr>
+              <a:tr h="1502508">
+                <a:tc vMerge="1">
+                  <a:txBody>
+                    <a:bodyPr/>
+                    <a:lstStyle/>
+                    <a:p>
+                      <a:pPr marL="0" algn="ctr" defTabSz="914400" rtl="0" eaLnBrk="1" latinLnBrk="0" hangingPunct="1"/>
+                      <a:endParaRPr lang="en-US" sz="1800" b="1" kern="1200" dirty="0">
+                        <a:solidFill>
+                          <a:schemeClr val="lt1"/>
+                        </a:solidFill>
+                        <a:latin typeface="+mn-lt"/>
+                        <a:ea typeface="+mn-ea"/>
+                        <a:cs typeface="+mn-cs"/>
+                      </a:endParaRPr>
+                    </a:p>
+                  </a:txBody>
+                  <a:tcPr anchor="ctr">
+                    <a:solidFill>
+                      <a:schemeClr val="accent1"/>
+                    </a:solidFill>
+                  </a:tcPr>
+                </a:tc>
+                <a:tc>
+                  <a:txBody>
+                    <a:bodyPr/>
+                    <a:lstStyle/>
+                    <a:p>
+                      <a:pPr marL="0" algn="ctr" defTabSz="914400" rtl="0" eaLnBrk="1" latinLnBrk="0" hangingPunct="1"/>
+                      <a:r>
+                        <a:rPr lang="en-US" sz="1800" b="1" kern="1200" dirty="0">
+                          <a:solidFill>
+                            <a:schemeClr val="lt1"/>
+                          </a:solidFill>
+                          <a:latin typeface="+mn-lt"/>
+                          <a:ea typeface="+mn-ea"/>
+                          <a:cs typeface="+mn-cs"/>
+                        </a:rPr>
+                        <a:t>Negative</a:t>
+                      </a:r>
+                    </a:p>
+                  </a:txBody>
+                  <a:tcPr vert="vert270" anchor="ctr">
+                    <a:solidFill>
+                      <a:schemeClr val="accent1"/>
+                    </a:solidFill>
+                  </a:tcPr>
+                </a:tc>
+                <a:tc>
+                  <a:txBody>
+                    <a:bodyPr/>
+                    <a:lstStyle/>
+                    <a:p>
+                      <a:pPr algn="ctr"/>
+                      <a:r>
+                        <a:rPr lang="en-US" b="1" dirty="0"/>
+                        <a:t>False Negative</a:t>
+                      </a:r>
+                    </a:p>
+                  </a:txBody>
+                  <a:tcPr anchor="ctr">
+                    <a:solidFill>
+                      <a:schemeClr val="bg1">
+                        <a:lumMod val="85000"/>
+                      </a:schemeClr>
+                    </a:solidFill>
+                  </a:tcPr>
+                </a:tc>
+                <a:tc>
+                  <a:txBody>
+                    <a:bodyPr/>
+                    <a:lstStyle/>
+                    <a:p>
+                      <a:pPr algn="ctr"/>
+                      <a:r>
+                        <a:rPr lang="en-US" b="1" dirty="0"/>
+                        <a:t>True Negative</a:t>
+                      </a:r>
+                    </a:p>
+                  </a:txBody>
+                  <a:tcPr anchor="ctr">
+                    <a:solidFill>
+                      <a:schemeClr val="bg1">
+                        <a:lumMod val="85000"/>
+                      </a:schemeClr>
+                    </a:solidFill>
+                  </a:tcPr>
+                </a:tc>
                 <a:extLst>
-                  <a:ext uri="{28A0092B-C50C-407E-A947-70E740481C1C}">
-                    <a14:useLocalDpi xmlns:a14="http://schemas.microsoft.com/office/drawing/2010/main" val="0"/>
-                  </a:ext>
-                  <a:ext uri="{96DAC541-7B7A-43D3-8B79-37D633B846F1}">
-                    <asvg:svgBlip xmlns:asvg="http://schemas.microsoft.com/office/drawing/2016/SVG/main" r:embed="rId7"/>
+                  <a:ext uri="{0D108BD9-81ED-4DB2-BD59-A6C34878D82A}">
+                    <a16:rowId xmlns:a16="http://schemas.microsoft.com/office/drawing/2014/main" val="1823597647"/>
                   </a:ext>
                 </a:extLst>
-              </a:blip>
-              <a:stretch>
-                <a:fillRect/>
-              </a:stretch>
-            </p:blipFill>
-            <p:spPr>
-              <a:xfrm>
-                <a:off x="6536314" y="3192842"/>
-                <a:ext cx="180000" cy="180000"/>
-              </a:xfrm>
-              <a:prstGeom prst="rect">
-                <a:avLst/>
-              </a:prstGeom>
-            </p:spPr>
-          </p:pic>
-          <p:pic>
-            <p:nvPicPr>
-              <p:cNvPr id="34" name="Graphic 33" descr="Add with solid fill">
-                <a:extLst>
-                  <a:ext uri="{FF2B5EF4-FFF2-40B4-BE49-F238E27FC236}">
-                    <a16:creationId xmlns:a16="http://schemas.microsoft.com/office/drawing/2014/main" id="{877917C8-4DCC-FA63-E784-3515643F3CD3}"/>
-                  </a:ext>
-                </a:extLst>
-              </p:cNvPr>
-              <p:cNvPicPr>
-                <a:picLocks noChangeAspect="1"/>
-              </p:cNvPicPr>
-              <p:nvPr/>
-            </p:nvPicPr>
-            <p:blipFill>
-              <a:blip r:embed="rId6">
-                <a:extLst>
-                  <a:ext uri="{28A0092B-C50C-407E-A947-70E740481C1C}">
-                    <a14:useLocalDpi xmlns:a14="http://schemas.microsoft.com/office/drawing/2010/main" val="0"/>
-                  </a:ext>
-                  <a:ext uri="{96DAC541-7B7A-43D3-8B79-37D633B846F1}">
-                    <asvg:svgBlip xmlns:asvg="http://schemas.microsoft.com/office/drawing/2016/SVG/main" r:embed="rId7"/>
-                  </a:ext>
-                </a:extLst>
-              </a:blip>
-              <a:stretch>
-                <a:fillRect/>
-              </a:stretch>
-            </p:blipFill>
-            <p:spPr>
-              <a:xfrm>
-                <a:off x="5828964" y="3238240"/>
-                <a:ext cx="180000" cy="180000"/>
-              </a:xfrm>
-              <a:prstGeom prst="rect">
-                <a:avLst/>
-              </a:prstGeom>
-            </p:spPr>
-          </p:pic>
-          <p:pic>
-            <p:nvPicPr>
-              <p:cNvPr id="35" name="Graphic 34" descr="Add with solid fill">
-                <a:extLst>
-                  <a:ext uri="{FF2B5EF4-FFF2-40B4-BE49-F238E27FC236}">
-                    <a16:creationId xmlns:a16="http://schemas.microsoft.com/office/drawing/2014/main" id="{56245EF5-4720-0FC7-D093-5A46BBAEDAAA}"/>
-                  </a:ext>
-                </a:extLst>
-              </p:cNvPr>
-              <p:cNvPicPr>
-                <a:picLocks noChangeAspect="1"/>
-              </p:cNvPicPr>
-              <p:nvPr/>
-            </p:nvPicPr>
-            <p:blipFill>
-              <a:blip r:embed="rId6">
-                <a:extLst>
-                  <a:ext uri="{28A0092B-C50C-407E-A947-70E740481C1C}">
-                    <a14:useLocalDpi xmlns:a14="http://schemas.microsoft.com/office/drawing/2010/main" val="0"/>
-                  </a:ext>
-                  <a:ext uri="{96DAC541-7B7A-43D3-8B79-37D633B846F1}">
-                    <asvg:svgBlip xmlns:asvg="http://schemas.microsoft.com/office/drawing/2016/SVG/main" r:embed="rId7"/>
-                  </a:ext>
-                </a:extLst>
-              </a:blip>
-              <a:stretch>
-                <a:fillRect/>
-              </a:stretch>
-            </p:blipFill>
-            <p:spPr>
-              <a:xfrm>
-                <a:off x="6096000" y="3008894"/>
-                <a:ext cx="180000" cy="180000"/>
-              </a:xfrm>
-              <a:prstGeom prst="rect">
-                <a:avLst/>
-              </a:prstGeom>
-            </p:spPr>
-          </p:pic>
-          <p:pic>
-            <p:nvPicPr>
-              <p:cNvPr id="36" name="Graphic 35" descr="Add with solid fill">
-                <a:extLst>
-                  <a:ext uri="{FF2B5EF4-FFF2-40B4-BE49-F238E27FC236}">
-                    <a16:creationId xmlns:a16="http://schemas.microsoft.com/office/drawing/2014/main" id="{B0375027-50CB-4D0C-3227-B5DF30A1BDE9}"/>
-                  </a:ext>
-                </a:extLst>
-              </p:cNvPr>
-              <p:cNvPicPr>
-                <a:picLocks noChangeAspect="1"/>
-              </p:cNvPicPr>
-              <p:nvPr/>
-            </p:nvPicPr>
-            <p:blipFill>
-              <a:blip r:embed="rId6">
-                <a:extLst>
-                  <a:ext uri="{28A0092B-C50C-407E-A947-70E740481C1C}">
-                    <a14:useLocalDpi xmlns:a14="http://schemas.microsoft.com/office/drawing/2010/main" val="0"/>
-                  </a:ext>
-                  <a:ext uri="{96DAC541-7B7A-43D3-8B79-37D633B846F1}">
-                    <asvg:svgBlip xmlns:asvg="http://schemas.microsoft.com/office/drawing/2016/SVG/main" r:embed="rId7"/>
-                  </a:ext>
-                </a:extLst>
-              </a:blip>
-              <a:stretch>
-                <a:fillRect/>
-              </a:stretch>
-            </p:blipFill>
-            <p:spPr>
-              <a:xfrm>
-                <a:off x="5532027" y="3552240"/>
-                <a:ext cx="180000" cy="180000"/>
-              </a:xfrm>
-              <a:prstGeom prst="rect">
-                <a:avLst/>
-              </a:prstGeom>
-            </p:spPr>
-          </p:pic>
-          <p:pic>
-            <p:nvPicPr>
-              <p:cNvPr id="37" name="Graphic 36" descr="Add with solid fill">
-                <a:extLst>
-                  <a:ext uri="{FF2B5EF4-FFF2-40B4-BE49-F238E27FC236}">
-                    <a16:creationId xmlns:a16="http://schemas.microsoft.com/office/drawing/2014/main" id="{47CBDAFF-B98F-2275-7CDA-A5CD09239703}"/>
-                  </a:ext>
-                </a:extLst>
-              </p:cNvPr>
-              <p:cNvPicPr>
-                <a:picLocks noChangeAspect="1"/>
-              </p:cNvPicPr>
-              <p:nvPr/>
-            </p:nvPicPr>
-            <p:blipFill>
-              <a:blip r:embed="rId6">
-                <a:extLst>
-                  <a:ext uri="{28A0092B-C50C-407E-A947-70E740481C1C}">
-                    <a14:useLocalDpi xmlns:a14="http://schemas.microsoft.com/office/drawing/2010/main" val="0"/>
-                  </a:ext>
-                  <a:ext uri="{96DAC541-7B7A-43D3-8B79-37D633B846F1}">
-                    <asvg:svgBlip xmlns:asvg="http://schemas.microsoft.com/office/drawing/2016/SVG/main" r:embed="rId7"/>
-                  </a:ext>
-                </a:extLst>
-              </a:blip>
-              <a:stretch>
-                <a:fillRect/>
-              </a:stretch>
-            </p:blipFill>
-            <p:spPr>
-              <a:xfrm>
-                <a:off x="6356314" y="2776227"/>
-                <a:ext cx="180000" cy="180000"/>
-              </a:xfrm>
-              <a:prstGeom prst="rect">
-                <a:avLst/>
-              </a:prstGeom>
-            </p:spPr>
-          </p:pic>
-          <p:pic>
-            <p:nvPicPr>
-              <p:cNvPr id="38" name="Graphic 37" descr="Add with solid fill">
-                <a:extLst>
-                  <a:ext uri="{FF2B5EF4-FFF2-40B4-BE49-F238E27FC236}">
-                    <a16:creationId xmlns:a16="http://schemas.microsoft.com/office/drawing/2014/main" id="{7C836EDD-06FA-62FA-2F50-CE570ED44B02}"/>
-                  </a:ext>
-                </a:extLst>
-              </p:cNvPr>
-              <p:cNvPicPr>
-                <a:picLocks noChangeAspect="1"/>
-              </p:cNvPicPr>
-              <p:nvPr/>
-            </p:nvPicPr>
-            <p:blipFill>
-              <a:blip r:embed="rId6">
-                <a:extLst>
-                  <a:ext uri="{28A0092B-C50C-407E-A947-70E740481C1C}">
-                    <a14:useLocalDpi xmlns:a14="http://schemas.microsoft.com/office/drawing/2010/main" val="0"/>
-                  </a:ext>
-                  <a:ext uri="{96DAC541-7B7A-43D3-8B79-37D633B846F1}">
-                    <asvg:svgBlip xmlns:asvg="http://schemas.microsoft.com/office/drawing/2016/SVG/main" r:embed="rId7"/>
-                  </a:ext>
-                </a:extLst>
-              </a:blip>
-              <a:stretch>
-                <a:fillRect/>
-              </a:stretch>
-            </p:blipFill>
-            <p:spPr>
-              <a:xfrm>
-                <a:off x="6074333" y="2567184"/>
-                <a:ext cx="180000" cy="180000"/>
-              </a:xfrm>
-              <a:prstGeom prst="rect">
-                <a:avLst/>
-              </a:prstGeom>
-            </p:spPr>
-          </p:pic>
-          <p:pic>
-            <p:nvPicPr>
-              <p:cNvPr id="39" name="Graphic 38" descr="Add with solid fill">
-                <a:extLst>
-                  <a:ext uri="{FF2B5EF4-FFF2-40B4-BE49-F238E27FC236}">
-                    <a16:creationId xmlns:a16="http://schemas.microsoft.com/office/drawing/2014/main" id="{8DC31047-43A1-831B-D73D-EE31FE4C4ECD}"/>
-                  </a:ext>
-                </a:extLst>
-              </p:cNvPr>
-              <p:cNvPicPr>
-                <a:picLocks noChangeAspect="1"/>
-              </p:cNvPicPr>
-              <p:nvPr/>
-            </p:nvPicPr>
-            <p:blipFill>
-              <a:blip r:embed="rId6">
-                <a:extLst>
-                  <a:ext uri="{28A0092B-C50C-407E-A947-70E740481C1C}">
-                    <a14:useLocalDpi xmlns:a14="http://schemas.microsoft.com/office/drawing/2010/main" val="0"/>
-                  </a:ext>
-                  <a:ext uri="{96DAC541-7B7A-43D3-8B79-37D633B846F1}">
-                    <asvg:svgBlip xmlns:asvg="http://schemas.microsoft.com/office/drawing/2016/SVG/main" r:embed="rId7"/>
-                  </a:ext>
-                </a:extLst>
-              </a:blip>
-              <a:stretch>
-                <a:fillRect/>
-              </a:stretch>
-            </p:blipFill>
-            <p:spPr>
-              <a:xfrm>
-                <a:off x="6446314" y="2227289"/>
-                <a:ext cx="180000" cy="180000"/>
-              </a:xfrm>
-              <a:prstGeom prst="rect">
-                <a:avLst/>
-              </a:prstGeom>
-            </p:spPr>
-          </p:pic>
-          <p:pic>
-            <p:nvPicPr>
-              <p:cNvPr id="40" name="Graphic 39" descr="Add with solid fill">
-                <a:extLst>
-                  <a:ext uri="{FF2B5EF4-FFF2-40B4-BE49-F238E27FC236}">
-                    <a16:creationId xmlns:a16="http://schemas.microsoft.com/office/drawing/2014/main" id="{EB6D8F2F-3971-C37F-B1B7-11D282223505}"/>
-                  </a:ext>
-                </a:extLst>
-              </p:cNvPr>
-              <p:cNvPicPr>
-                <a:picLocks noChangeAspect="1"/>
-              </p:cNvPicPr>
-              <p:nvPr/>
-            </p:nvPicPr>
-            <p:blipFill>
-              <a:blip r:embed="rId6">
-                <a:extLst>
-                  <a:ext uri="{28A0092B-C50C-407E-A947-70E740481C1C}">
-                    <a14:useLocalDpi xmlns:a14="http://schemas.microsoft.com/office/drawing/2010/main" val="0"/>
-                  </a:ext>
-                  <a:ext uri="{96DAC541-7B7A-43D3-8B79-37D633B846F1}">
-                    <asvg:svgBlip xmlns:asvg="http://schemas.microsoft.com/office/drawing/2016/SVG/main" r:embed="rId7"/>
-                  </a:ext>
-                </a:extLst>
-              </a:blip>
-              <a:stretch>
-                <a:fillRect/>
-              </a:stretch>
-            </p:blipFill>
-            <p:spPr>
-              <a:xfrm>
-                <a:off x="5740596" y="2732765"/>
-                <a:ext cx="180000" cy="180000"/>
-              </a:xfrm>
-              <a:prstGeom prst="rect">
-                <a:avLst/>
-              </a:prstGeom>
-            </p:spPr>
-          </p:pic>
-          <p:pic>
-            <p:nvPicPr>
-              <p:cNvPr id="41" name="Graphic 40" descr="Add with solid fill">
-                <a:extLst>
-                  <a:ext uri="{FF2B5EF4-FFF2-40B4-BE49-F238E27FC236}">
-                    <a16:creationId xmlns:a16="http://schemas.microsoft.com/office/drawing/2014/main" id="{1744F834-5F36-22C2-8418-DBAA09D57AF7}"/>
-                  </a:ext>
-                </a:extLst>
-              </p:cNvPr>
-              <p:cNvPicPr>
-                <a:picLocks noChangeAspect="1"/>
-              </p:cNvPicPr>
-              <p:nvPr/>
-            </p:nvPicPr>
-            <p:blipFill>
-              <a:blip r:embed="rId6">
-                <a:extLst>
-                  <a:ext uri="{28A0092B-C50C-407E-A947-70E740481C1C}">
-                    <a14:useLocalDpi xmlns:a14="http://schemas.microsoft.com/office/drawing/2010/main" val="0"/>
-                  </a:ext>
-                  <a:ext uri="{96DAC541-7B7A-43D3-8B79-37D633B846F1}">
-                    <asvg:svgBlip xmlns:asvg="http://schemas.microsoft.com/office/drawing/2016/SVG/main" r:embed="rId7"/>
-                  </a:ext>
-                </a:extLst>
-              </a:blip>
-              <a:stretch>
-                <a:fillRect/>
-              </a:stretch>
-            </p:blipFill>
-            <p:spPr>
-              <a:xfrm>
-                <a:off x="5406859" y="3971408"/>
-                <a:ext cx="180000" cy="180000"/>
-              </a:xfrm>
-              <a:prstGeom prst="rect">
-                <a:avLst/>
-              </a:prstGeom>
-            </p:spPr>
-          </p:pic>
-          <p:pic>
-            <p:nvPicPr>
-              <p:cNvPr id="42" name="Graphic 41" descr="Add with solid fill">
-                <a:extLst>
-                  <a:ext uri="{FF2B5EF4-FFF2-40B4-BE49-F238E27FC236}">
-                    <a16:creationId xmlns:a16="http://schemas.microsoft.com/office/drawing/2014/main" id="{7601757D-E0AF-A5B7-05AC-69442187D111}"/>
-                  </a:ext>
-                </a:extLst>
-              </p:cNvPr>
-              <p:cNvPicPr>
-                <a:picLocks noChangeAspect="1"/>
-              </p:cNvPicPr>
-              <p:nvPr/>
-            </p:nvPicPr>
-            <p:blipFill>
-              <a:blip r:embed="rId6">
-                <a:extLst>
-                  <a:ext uri="{28A0092B-C50C-407E-A947-70E740481C1C}">
-                    <a14:useLocalDpi xmlns:a14="http://schemas.microsoft.com/office/drawing/2010/main" val="0"/>
-                  </a:ext>
-                  <a:ext uri="{96DAC541-7B7A-43D3-8B79-37D633B846F1}">
-                    <asvg:svgBlip xmlns:asvg="http://schemas.microsoft.com/office/drawing/2016/SVG/main" r:embed="rId7"/>
-                  </a:ext>
-                </a:extLst>
-              </a:blip>
-              <a:stretch>
-                <a:fillRect/>
-              </a:stretch>
-            </p:blipFill>
-            <p:spPr>
-              <a:xfrm>
-                <a:off x="5804333" y="3982900"/>
-                <a:ext cx="180000" cy="180000"/>
-              </a:xfrm>
-              <a:prstGeom prst="rect">
-                <a:avLst/>
-              </a:prstGeom>
-            </p:spPr>
-          </p:pic>
-          <p:pic>
-            <p:nvPicPr>
-              <p:cNvPr id="43" name="Graphic 42" descr="Add with solid fill">
-                <a:extLst>
-                  <a:ext uri="{FF2B5EF4-FFF2-40B4-BE49-F238E27FC236}">
-                    <a16:creationId xmlns:a16="http://schemas.microsoft.com/office/drawing/2014/main" id="{03DFE5FF-FFBF-5520-AEDB-D4FAF307D7AA}"/>
-                  </a:ext>
-                </a:extLst>
-              </p:cNvPr>
-              <p:cNvPicPr>
-                <a:picLocks noChangeAspect="1"/>
-              </p:cNvPicPr>
-              <p:nvPr/>
-            </p:nvPicPr>
-            <p:blipFill>
-              <a:blip r:embed="rId6">
-                <a:extLst>
-                  <a:ext uri="{28A0092B-C50C-407E-A947-70E740481C1C}">
-                    <a14:useLocalDpi xmlns:a14="http://schemas.microsoft.com/office/drawing/2010/main" val="0"/>
-                  </a:ext>
-                  <a:ext uri="{96DAC541-7B7A-43D3-8B79-37D633B846F1}">
-                    <asvg:svgBlip xmlns:asvg="http://schemas.microsoft.com/office/drawing/2016/SVG/main" r:embed="rId7"/>
-                  </a:ext>
-                </a:extLst>
-              </a:blip>
-              <a:stretch>
-                <a:fillRect/>
-              </a:stretch>
-            </p:blipFill>
-            <p:spPr>
-              <a:xfrm>
-                <a:off x="5517633" y="3140207"/>
-                <a:ext cx="180000" cy="180000"/>
-              </a:xfrm>
-              <a:prstGeom prst="rect">
-                <a:avLst/>
-              </a:prstGeom>
-            </p:spPr>
-          </p:pic>
-          <p:pic>
-            <p:nvPicPr>
-              <p:cNvPr id="44" name="Graphic 43" descr="Add with solid fill">
-                <a:extLst>
-                  <a:ext uri="{FF2B5EF4-FFF2-40B4-BE49-F238E27FC236}">
-                    <a16:creationId xmlns:a16="http://schemas.microsoft.com/office/drawing/2014/main" id="{26FE4028-3B97-2109-B63D-ECB21CBAA83D}"/>
-                  </a:ext>
-                </a:extLst>
-              </p:cNvPr>
-              <p:cNvPicPr>
-                <a:picLocks noChangeAspect="1"/>
-              </p:cNvPicPr>
-              <p:nvPr/>
-            </p:nvPicPr>
-            <p:blipFill>
-              <a:blip r:embed="rId6">
-                <a:extLst>
-                  <a:ext uri="{28A0092B-C50C-407E-A947-70E740481C1C}">
-                    <a14:useLocalDpi xmlns:a14="http://schemas.microsoft.com/office/drawing/2010/main" val="0"/>
-                  </a:ext>
-                  <a:ext uri="{96DAC541-7B7A-43D3-8B79-37D633B846F1}">
-                    <asvg:svgBlip xmlns:asvg="http://schemas.microsoft.com/office/drawing/2016/SVG/main" r:embed="rId7"/>
-                  </a:ext>
-                </a:extLst>
-              </a:blip>
-              <a:stretch>
-                <a:fillRect/>
-              </a:stretch>
-            </p:blipFill>
-            <p:spPr>
-              <a:xfrm>
-                <a:off x="5041217" y="3916645"/>
-                <a:ext cx="180000" cy="180000"/>
-              </a:xfrm>
-              <a:prstGeom prst="rect">
-                <a:avLst/>
-              </a:prstGeom>
-            </p:spPr>
-          </p:pic>
-          <p:pic>
-            <p:nvPicPr>
-              <p:cNvPr id="45" name="Graphic 44" descr="Add with solid fill">
-                <a:extLst>
-                  <a:ext uri="{FF2B5EF4-FFF2-40B4-BE49-F238E27FC236}">
-                    <a16:creationId xmlns:a16="http://schemas.microsoft.com/office/drawing/2014/main" id="{1A32697B-F3EC-31CB-E5A5-1746771F93EA}"/>
-                  </a:ext>
-                </a:extLst>
-              </p:cNvPr>
-              <p:cNvPicPr>
-                <a:picLocks noChangeAspect="1"/>
-              </p:cNvPicPr>
-              <p:nvPr/>
-            </p:nvPicPr>
-            <p:blipFill>
-              <a:blip r:embed="rId6">
-                <a:extLst>
-                  <a:ext uri="{28A0092B-C50C-407E-A947-70E740481C1C}">
-                    <a14:useLocalDpi xmlns:a14="http://schemas.microsoft.com/office/drawing/2010/main" val="0"/>
-                  </a:ext>
-                  <a:ext uri="{96DAC541-7B7A-43D3-8B79-37D633B846F1}">
-                    <asvg:svgBlip xmlns:asvg="http://schemas.microsoft.com/office/drawing/2016/SVG/main" r:embed="rId7"/>
-                  </a:ext>
-                </a:extLst>
-              </a:blip>
-              <a:stretch>
-                <a:fillRect/>
-              </a:stretch>
-            </p:blipFill>
-            <p:spPr>
-              <a:xfrm>
-                <a:off x="5427633" y="4487680"/>
-                <a:ext cx="180000" cy="180000"/>
-              </a:xfrm>
-              <a:prstGeom prst="rect">
-                <a:avLst/>
-              </a:prstGeom>
-            </p:spPr>
-          </p:pic>
-          <p:pic>
-            <p:nvPicPr>
-              <p:cNvPr id="46" name="Graphic 45" descr="Add with solid fill">
-                <a:extLst>
-                  <a:ext uri="{FF2B5EF4-FFF2-40B4-BE49-F238E27FC236}">
-                    <a16:creationId xmlns:a16="http://schemas.microsoft.com/office/drawing/2014/main" id="{64DBDA9C-1872-2A7B-BE53-1AA06BE1817D}"/>
-                  </a:ext>
-                </a:extLst>
-              </p:cNvPr>
-              <p:cNvPicPr>
-                <a:picLocks noChangeAspect="1"/>
-              </p:cNvPicPr>
-              <p:nvPr/>
-            </p:nvPicPr>
-            <p:blipFill>
-              <a:blip r:embed="rId6">
-                <a:extLst>
-                  <a:ext uri="{28A0092B-C50C-407E-A947-70E740481C1C}">
-                    <a14:useLocalDpi xmlns:a14="http://schemas.microsoft.com/office/drawing/2010/main" val="0"/>
-                  </a:ext>
-                  <a:ext uri="{96DAC541-7B7A-43D3-8B79-37D633B846F1}">
-                    <asvg:svgBlip xmlns:asvg="http://schemas.microsoft.com/office/drawing/2016/SVG/main" r:embed="rId7"/>
-                  </a:ext>
-                </a:extLst>
-              </a:blip>
-              <a:stretch>
-                <a:fillRect/>
-              </a:stretch>
-            </p:blipFill>
-            <p:spPr>
-              <a:xfrm>
-                <a:off x="5159113" y="4252908"/>
-                <a:ext cx="180000" cy="180000"/>
-              </a:xfrm>
-              <a:prstGeom prst="rect">
-                <a:avLst/>
-              </a:prstGeom>
-            </p:spPr>
-          </p:pic>
-          <p:pic>
-            <p:nvPicPr>
-              <p:cNvPr id="47" name="Graphic 46" descr="Add with solid fill">
-                <a:extLst>
-                  <a:ext uri="{FF2B5EF4-FFF2-40B4-BE49-F238E27FC236}">
-                    <a16:creationId xmlns:a16="http://schemas.microsoft.com/office/drawing/2014/main" id="{ACC706FC-FC70-402D-A4FB-349A4ED69885}"/>
-                  </a:ext>
-                </a:extLst>
-              </p:cNvPr>
-              <p:cNvPicPr>
-                <a:picLocks noChangeAspect="1"/>
-              </p:cNvPicPr>
-              <p:nvPr/>
-            </p:nvPicPr>
-            <p:blipFill>
-              <a:blip r:embed="rId6">
-                <a:extLst>
-                  <a:ext uri="{28A0092B-C50C-407E-A947-70E740481C1C}">
-                    <a14:useLocalDpi xmlns:a14="http://schemas.microsoft.com/office/drawing/2010/main" val="0"/>
-                  </a:ext>
-                  <a:ext uri="{96DAC541-7B7A-43D3-8B79-37D633B846F1}">
-                    <asvg:svgBlip xmlns:asvg="http://schemas.microsoft.com/office/drawing/2016/SVG/main" r:embed="rId7"/>
-                  </a:ext>
-                </a:extLst>
-              </a:blip>
-              <a:stretch>
-                <a:fillRect/>
-              </a:stretch>
-            </p:blipFill>
-            <p:spPr>
-              <a:xfrm>
-                <a:off x="4840550" y="4114737"/>
-                <a:ext cx="180000" cy="180000"/>
-              </a:xfrm>
-              <a:prstGeom prst="rect">
-                <a:avLst/>
-              </a:prstGeom>
-            </p:spPr>
-          </p:pic>
-          <p:pic>
-            <p:nvPicPr>
-              <p:cNvPr id="48" name="Graphic 47" descr="Add with solid fill">
-                <a:extLst>
-                  <a:ext uri="{FF2B5EF4-FFF2-40B4-BE49-F238E27FC236}">
-                    <a16:creationId xmlns:a16="http://schemas.microsoft.com/office/drawing/2014/main" id="{6462925C-6C0C-EB2A-6CC1-1FFF8184E1B4}"/>
-                  </a:ext>
-                </a:extLst>
-              </p:cNvPr>
-              <p:cNvPicPr>
-                <a:picLocks noChangeAspect="1"/>
-              </p:cNvPicPr>
-              <p:nvPr/>
-            </p:nvPicPr>
-            <p:blipFill>
-              <a:blip r:embed="rId6">
-                <a:extLst>
-                  <a:ext uri="{28A0092B-C50C-407E-A947-70E740481C1C}">
-                    <a14:useLocalDpi xmlns:a14="http://schemas.microsoft.com/office/drawing/2010/main" val="0"/>
-                  </a:ext>
-                  <a:ext uri="{96DAC541-7B7A-43D3-8B79-37D633B846F1}">
-                    <asvg:svgBlip xmlns:asvg="http://schemas.microsoft.com/office/drawing/2016/SVG/main" r:embed="rId7"/>
-                  </a:ext>
-                </a:extLst>
-              </a:blip>
-              <a:stretch>
-                <a:fillRect/>
-              </a:stretch>
-            </p:blipFill>
-            <p:spPr>
-              <a:xfrm>
-                <a:off x="5799056" y="2970411"/>
-                <a:ext cx="180000" cy="180000"/>
-              </a:xfrm>
-              <a:prstGeom prst="rect">
-                <a:avLst/>
-              </a:prstGeom>
-            </p:spPr>
-          </p:pic>
-          <p:pic>
-            <p:nvPicPr>
-              <p:cNvPr id="49" name="Graphic 48" descr="Add with solid fill">
-                <a:extLst>
-                  <a:ext uri="{FF2B5EF4-FFF2-40B4-BE49-F238E27FC236}">
-                    <a16:creationId xmlns:a16="http://schemas.microsoft.com/office/drawing/2014/main" id="{9A7B45ED-692D-09D5-88EE-96CC06AD11B9}"/>
-                  </a:ext>
-                </a:extLst>
-              </p:cNvPr>
-              <p:cNvPicPr>
-                <a:picLocks noChangeAspect="1"/>
-              </p:cNvPicPr>
-              <p:nvPr/>
-            </p:nvPicPr>
-            <p:blipFill>
-              <a:blip r:embed="rId6">
-                <a:extLst>
-                  <a:ext uri="{28A0092B-C50C-407E-A947-70E740481C1C}">
-                    <a14:useLocalDpi xmlns:a14="http://schemas.microsoft.com/office/drawing/2010/main" val="0"/>
-                  </a:ext>
-                  <a:ext uri="{96DAC541-7B7A-43D3-8B79-37D633B846F1}">
-                    <asvg:svgBlip xmlns:asvg="http://schemas.microsoft.com/office/drawing/2016/SVG/main" r:embed="rId7"/>
-                  </a:ext>
-                </a:extLst>
-              </a:blip>
-              <a:stretch>
-                <a:fillRect/>
-              </a:stretch>
-            </p:blipFill>
-            <p:spPr>
-              <a:xfrm>
-                <a:off x="5233164" y="3796886"/>
-                <a:ext cx="180000" cy="180000"/>
-              </a:xfrm>
-              <a:prstGeom prst="rect">
-                <a:avLst/>
-              </a:prstGeom>
-            </p:spPr>
-          </p:pic>
-          <p:pic>
-            <p:nvPicPr>
-              <p:cNvPr id="50" name="Graphic 49" descr="Add with solid fill">
-                <a:extLst>
-                  <a:ext uri="{FF2B5EF4-FFF2-40B4-BE49-F238E27FC236}">
-                    <a16:creationId xmlns:a16="http://schemas.microsoft.com/office/drawing/2014/main" id="{AF03C193-3191-4585-9CE4-DF49881D7C20}"/>
-                  </a:ext>
-                </a:extLst>
-              </p:cNvPr>
-              <p:cNvPicPr>
-                <a:picLocks noChangeAspect="1"/>
-              </p:cNvPicPr>
-              <p:nvPr/>
-            </p:nvPicPr>
-            <p:blipFill>
-              <a:blip r:embed="rId6">
-                <a:extLst>
-                  <a:ext uri="{28A0092B-C50C-407E-A947-70E740481C1C}">
-                    <a14:useLocalDpi xmlns:a14="http://schemas.microsoft.com/office/drawing/2010/main" val="0"/>
-                  </a:ext>
-                  <a:ext uri="{96DAC541-7B7A-43D3-8B79-37D633B846F1}">
-                    <asvg:svgBlip xmlns:asvg="http://schemas.microsoft.com/office/drawing/2016/SVG/main" r:embed="rId7"/>
-                  </a:ext>
-                </a:extLst>
-              </a:blip>
-              <a:stretch>
-                <a:fillRect/>
-              </a:stretch>
-            </p:blipFill>
-            <p:spPr>
-              <a:xfrm>
-                <a:off x="6074333" y="3429000"/>
-                <a:ext cx="180000" cy="180000"/>
-              </a:xfrm>
-              <a:prstGeom prst="rect">
-                <a:avLst/>
-              </a:prstGeom>
-            </p:spPr>
-          </p:pic>
-          <p:pic>
-            <p:nvPicPr>
-              <p:cNvPr id="51" name="Graphic 50" descr="Add with solid fill">
-                <a:extLst>
-                  <a:ext uri="{FF2B5EF4-FFF2-40B4-BE49-F238E27FC236}">
-                    <a16:creationId xmlns:a16="http://schemas.microsoft.com/office/drawing/2014/main" id="{38506BDA-B43F-36B3-879B-49AAEC4133C5}"/>
-                  </a:ext>
-                </a:extLst>
-              </p:cNvPr>
-              <p:cNvPicPr>
-                <a:picLocks noChangeAspect="1"/>
-              </p:cNvPicPr>
-              <p:nvPr/>
-            </p:nvPicPr>
-            <p:blipFill>
-              <a:blip r:embed="rId6">
-                <a:extLst>
-                  <a:ext uri="{28A0092B-C50C-407E-A947-70E740481C1C}">
-                    <a14:useLocalDpi xmlns:a14="http://schemas.microsoft.com/office/drawing/2010/main" val="0"/>
-                  </a:ext>
-                  <a:ext uri="{96DAC541-7B7A-43D3-8B79-37D633B846F1}">
-                    <asvg:svgBlip xmlns:asvg="http://schemas.microsoft.com/office/drawing/2016/SVG/main" r:embed="rId7"/>
-                  </a:ext>
-                </a:extLst>
-              </a:blip>
-              <a:stretch>
-                <a:fillRect/>
-              </a:stretch>
-            </p:blipFill>
-            <p:spPr>
-              <a:xfrm>
-                <a:off x="5634263" y="4272284"/>
-                <a:ext cx="180000" cy="180000"/>
-              </a:xfrm>
-              <a:prstGeom prst="rect">
-                <a:avLst/>
-              </a:prstGeom>
-            </p:spPr>
-          </p:pic>
-          <p:pic>
-            <p:nvPicPr>
-              <p:cNvPr id="52" name="Graphic 51" descr="Add with solid fill">
-                <a:extLst>
-                  <a:ext uri="{FF2B5EF4-FFF2-40B4-BE49-F238E27FC236}">
-                    <a16:creationId xmlns:a16="http://schemas.microsoft.com/office/drawing/2014/main" id="{54B0CD38-CD6F-308C-1C84-B5D6E6827977}"/>
-                  </a:ext>
-                </a:extLst>
-              </p:cNvPr>
-              <p:cNvPicPr>
-                <a:picLocks noChangeAspect="1"/>
-              </p:cNvPicPr>
-              <p:nvPr/>
-            </p:nvPicPr>
-            <p:blipFill>
-              <a:blip r:embed="rId6">
-                <a:extLst>
-                  <a:ext uri="{28A0092B-C50C-407E-A947-70E740481C1C}">
-                    <a14:useLocalDpi xmlns:a14="http://schemas.microsoft.com/office/drawing/2010/main" val="0"/>
-                  </a:ext>
-                  <a:ext uri="{96DAC541-7B7A-43D3-8B79-37D633B846F1}">
-                    <asvg:svgBlip xmlns:asvg="http://schemas.microsoft.com/office/drawing/2016/SVG/main" r:embed="rId7"/>
-                  </a:ext>
-                </a:extLst>
-              </a:blip>
-              <a:stretch>
-                <a:fillRect/>
-              </a:stretch>
-            </p:blipFill>
-            <p:spPr>
-              <a:xfrm>
-                <a:off x="5281837" y="3381286"/>
-                <a:ext cx="180000" cy="180000"/>
-              </a:xfrm>
-              <a:prstGeom prst="rect">
-                <a:avLst/>
-              </a:prstGeom>
-            </p:spPr>
-          </p:pic>
-          <p:pic>
-            <p:nvPicPr>
-              <p:cNvPr id="53" name="Graphic 52" descr="Add with solid fill">
-                <a:extLst>
-                  <a:ext uri="{FF2B5EF4-FFF2-40B4-BE49-F238E27FC236}">
-                    <a16:creationId xmlns:a16="http://schemas.microsoft.com/office/drawing/2014/main" id="{191CA9D7-2213-55DC-D9A9-50F5724FF7D3}"/>
-                  </a:ext>
-                </a:extLst>
-              </p:cNvPr>
-              <p:cNvPicPr>
-                <a:picLocks noChangeAspect="1"/>
-              </p:cNvPicPr>
-              <p:nvPr/>
-            </p:nvPicPr>
-            <p:blipFill>
-              <a:blip r:embed="rId6">
-                <a:extLst>
-                  <a:ext uri="{28A0092B-C50C-407E-A947-70E740481C1C}">
-                    <a14:useLocalDpi xmlns:a14="http://schemas.microsoft.com/office/drawing/2010/main" val="0"/>
-                  </a:ext>
-                  <a:ext uri="{96DAC541-7B7A-43D3-8B79-37D633B846F1}">
-                    <asvg:svgBlip xmlns:asvg="http://schemas.microsoft.com/office/drawing/2016/SVG/main" r:embed="rId7"/>
-                  </a:ext>
-                </a:extLst>
-              </a:blip>
-              <a:stretch>
-                <a:fillRect/>
-              </a:stretch>
-            </p:blipFill>
-            <p:spPr>
-              <a:xfrm>
-                <a:off x="5799056" y="3642240"/>
-                <a:ext cx="180000" cy="180000"/>
-              </a:xfrm>
-              <a:prstGeom prst="rect">
-                <a:avLst/>
-              </a:prstGeom>
-            </p:spPr>
-          </p:pic>
-          <p:pic>
-            <p:nvPicPr>
-              <p:cNvPr id="54" name="Graphic 53" descr="Add with solid fill">
-                <a:extLst>
-                  <a:ext uri="{FF2B5EF4-FFF2-40B4-BE49-F238E27FC236}">
-                    <a16:creationId xmlns:a16="http://schemas.microsoft.com/office/drawing/2014/main" id="{65A216A2-224A-C9B4-BC16-18CEB6FBB4A6}"/>
-                  </a:ext>
-                </a:extLst>
-              </p:cNvPr>
-              <p:cNvPicPr>
-                <a:picLocks noChangeAspect="1"/>
-              </p:cNvPicPr>
-              <p:nvPr/>
-            </p:nvPicPr>
-            <p:blipFill>
-              <a:blip r:embed="rId6">
-                <a:extLst>
-                  <a:ext uri="{28A0092B-C50C-407E-A947-70E740481C1C}">
-                    <a14:useLocalDpi xmlns:a14="http://schemas.microsoft.com/office/drawing/2010/main" val="0"/>
-                  </a:ext>
-                  <a:ext uri="{96DAC541-7B7A-43D3-8B79-37D633B846F1}">
-                    <asvg:svgBlip xmlns:asvg="http://schemas.microsoft.com/office/drawing/2016/SVG/main" r:embed="rId7"/>
-                  </a:ext>
-                </a:extLst>
-              </a:blip>
-              <a:stretch>
-                <a:fillRect/>
-              </a:stretch>
-            </p:blipFill>
-            <p:spPr>
-              <a:xfrm>
-                <a:off x="4710195" y="4745533"/>
-                <a:ext cx="180000" cy="180000"/>
-              </a:xfrm>
-              <a:prstGeom prst="rect">
-                <a:avLst/>
-              </a:prstGeom>
-            </p:spPr>
-          </p:pic>
-          <p:pic>
-            <p:nvPicPr>
-              <p:cNvPr id="55" name="Graphic 54" descr="Add with solid fill">
-                <a:extLst>
-                  <a:ext uri="{FF2B5EF4-FFF2-40B4-BE49-F238E27FC236}">
-                    <a16:creationId xmlns:a16="http://schemas.microsoft.com/office/drawing/2014/main" id="{EEC8227E-7DA4-1EBD-1ED3-2EE7D3C30CC5}"/>
-                  </a:ext>
-                </a:extLst>
-              </p:cNvPr>
-              <p:cNvPicPr>
-                <a:picLocks noChangeAspect="1"/>
-              </p:cNvPicPr>
-              <p:nvPr/>
-            </p:nvPicPr>
-            <p:blipFill>
-              <a:blip r:embed="rId6">
-                <a:extLst>
-                  <a:ext uri="{28A0092B-C50C-407E-A947-70E740481C1C}">
-                    <a14:useLocalDpi xmlns:a14="http://schemas.microsoft.com/office/drawing/2010/main" val="0"/>
-                  </a:ext>
-                  <a:ext uri="{96DAC541-7B7A-43D3-8B79-37D633B846F1}">
-                    <asvg:svgBlip xmlns:asvg="http://schemas.microsoft.com/office/drawing/2016/SVG/main" r:embed="rId7"/>
-                  </a:ext>
-                </a:extLst>
-              </a:blip>
-              <a:stretch>
-                <a:fillRect/>
-              </a:stretch>
-            </p:blipFill>
-            <p:spPr>
-              <a:xfrm>
-                <a:off x="4838659" y="4430135"/>
-                <a:ext cx="180000" cy="180000"/>
-              </a:xfrm>
-              <a:prstGeom prst="rect">
-                <a:avLst/>
-              </a:prstGeom>
-            </p:spPr>
-          </p:pic>
-          <p:pic>
-            <p:nvPicPr>
-              <p:cNvPr id="56" name="Graphic 55" descr="Add with solid fill">
-                <a:extLst>
-                  <a:ext uri="{FF2B5EF4-FFF2-40B4-BE49-F238E27FC236}">
-                    <a16:creationId xmlns:a16="http://schemas.microsoft.com/office/drawing/2014/main" id="{017CB6EF-358D-FDCD-75DC-4B429E620D0A}"/>
-                  </a:ext>
-                </a:extLst>
-              </p:cNvPr>
-              <p:cNvPicPr>
-                <a:picLocks noChangeAspect="1"/>
-              </p:cNvPicPr>
-              <p:nvPr/>
-            </p:nvPicPr>
-            <p:blipFill>
-              <a:blip r:embed="rId6">
-                <a:extLst>
-                  <a:ext uri="{28A0092B-C50C-407E-A947-70E740481C1C}">
-                    <a14:useLocalDpi xmlns:a14="http://schemas.microsoft.com/office/drawing/2010/main" val="0"/>
-                  </a:ext>
-                  <a:ext uri="{96DAC541-7B7A-43D3-8B79-37D633B846F1}">
-                    <asvg:svgBlip xmlns:asvg="http://schemas.microsoft.com/office/drawing/2016/SVG/main" r:embed="rId7"/>
-                  </a:ext>
-                </a:extLst>
-              </a:blip>
-              <a:stretch>
-                <a:fillRect/>
-              </a:stretch>
-            </p:blipFill>
-            <p:spPr>
-              <a:xfrm>
-                <a:off x="6176314" y="3754775"/>
-                <a:ext cx="180000" cy="180000"/>
-              </a:xfrm>
-              <a:prstGeom prst="rect">
-                <a:avLst/>
-              </a:prstGeom>
-            </p:spPr>
-          </p:pic>
-          <p:pic>
-            <p:nvPicPr>
-              <p:cNvPr id="57" name="Graphic 56" descr="Add with solid fill">
-                <a:extLst>
-                  <a:ext uri="{FF2B5EF4-FFF2-40B4-BE49-F238E27FC236}">
-                    <a16:creationId xmlns:a16="http://schemas.microsoft.com/office/drawing/2014/main" id="{743895D3-FDB6-7681-0384-C283F164F9BC}"/>
-                  </a:ext>
-                </a:extLst>
-              </p:cNvPr>
-              <p:cNvPicPr>
-                <a:picLocks noChangeAspect="1"/>
-              </p:cNvPicPr>
-              <p:nvPr/>
-            </p:nvPicPr>
-            <p:blipFill>
-              <a:blip r:embed="rId6">
-                <a:extLst>
-                  <a:ext uri="{28A0092B-C50C-407E-A947-70E740481C1C}">
-                    <a14:useLocalDpi xmlns:a14="http://schemas.microsoft.com/office/drawing/2010/main" val="0"/>
-                  </a:ext>
-                  <a:ext uri="{96DAC541-7B7A-43D3-8B79-37D633B846F1}">
-                    <asvg:svgBlip xmlns:asvg="http://schemas.microsoft.com/office/drawing/2016/SVG/main" r:embed="rId7"/>
-                  </a:ext>
-                </a:extLst>
-              </a:blip>
-              <a:stretch>
-                <a:fillRect/>
-              </a:stretch>
-            </p:blipFill>
-            <p:spPr>
-              <a:xfrm>
-                <a:off x="5119169" y="4618930"/>
-                <a:ext cx="180000" cy="180000"/>
-              </a:xfrm>
-              <a:prstGeom prst="rect">
-                <a:avLst/>
-              </a:prstGeom>
-            </p:spPr>
-          </p:pic>
-          <p:pic>
-            <p:nvPicPr>
-              <p:cNvPr id="58" name="Graphic 57" descr="Add with solid fill">
-                <a:extLst>
-                  <a:ext uri="{FF2B5EF4-FFF2-40B4-BE49-F238E27FC236}">
-                    <a16:creationId xmlns:a16="http://schemas.microsoft.com/office/drawing/2014/main" id="{3A1FDF27-CC2B-540A-C087-2EFE46C3CEFB}"/>
-                  </a:ext>
-                </a:extLst>
-              </p:cNvPr>
-              <p:cNvPicPr>
-                <a:picLocks noChangeAspect="1"/>
-              </p:cNvPicPr>
-              <p:nvPr/>
-            </p:nvPicPr>
-            <p:blipFill>
-              <a:blip r:embed="rId6">
-                <a:extLst>
-                  <a:ext uri="{28A0092B-C50C-407E-A947-70E740481C1C}">
-                    <a14:useLocalDpi xmlns:a14="http://schemas.microsoft.com/office/drawing/2010/main" val="0"/>
-                  </a:ext>
-                  <a:ext uri="{96DAC541-7B7A-43D3-8B79-37D633B846F1}">
-                    <asvg:svgBlip xmlns:asvg="http://schemas.microsoft.com/office/drawing/2016/SVG/main" r:embed="rId7"/>
-                  </a:ext>
-                </a:extLst>
-              </a:blip>
-              <a:stretch>
-                <a:fillRect/>
-              </a:stretch>
-            </p:blipFill>
-            <p:spPr>
-              <a:xfrm>
-                <a:off x="5566671" y="3826645"/>
-                <a:ext cx="180000" cy="180000"/>
-              </a:xfrm>
-              <a:prstGeom prst="rect">
-                <a:avLst/>
-              </a:prstGeom>
-            </p:spPr>
-          </p:pic>
-          <p:pic>
-            <p:nvPicPr>
-              <p:cNvPr id="59" name="Graphic 58" descr="Add with solid fill">
-                <a:extLst>
-                  <a:ext uri="{FF2B5EF4-FFF2-40B4-BE49-F238E27FC236}">
-                    <a16:creationId xmlns:a16="http://schemas.microsoft.com/office/drawing/2014/main" id="{5FE96FD2-92C8-4B13-8BFF-74A32DC403D8}"/>
-                  </a:ext>
-                </a:extLst>
-              </p:cNvPr>
-              <p:cNvPicPr>
-                <a:picLocks noChangeAspect="1"/>
-              </p:cNvPicPr>
-              <p:nvPr/>
-            </p:nvPicPr>
-            <p:blipFill>
-              <a:blip r:embed="rId6">
-                <a:extLst>
-                  <a:ext uri="{28A0092B-C50C-407E-A947-70E740481C1C}">
-                    <a14:useLocalDpi xmlns:a14="http://schemas.microsoft.com/office/drawing/2010/main" val="0"/>
-                  </a:ext>
-                  <a:ext uri="{96DAC541-7B7A-43D3-8B79-37D633B846F1}">
-                    <asvg:svgBlip xmlns:asvg="http://schemas.microsoft.com/office/drawing/2016/SVG/main" r:embed="rId7"/>
-                  </a:ext>
-                </a:extLst>
-              </a:blip>
-              <a:stretch>
-                <a:fillRect/>
-              </a:stretch>
-            </p:blipFill>
-            <p:spPr>
-              <a:xfrm>
-                <a:off x="6882032" y="2676191"/>
-                <a:ext cx="180000" cy="180000"/>
-              </a:xfrm>
-              <a:prstGeom prst="rect">
-                <a:avLst/>
-              </a:prstGeom>
-            </p:spPr>
-          </p:pic>
-          <p:pic>
-            <p:nvPicPr>
-              <p:cNvPr id="60" name="Graphic 59" descr="Add with solid fill">
-                <a:extLst>
-                  <a:ext uri="{FF2B5EF4-FFF2-40B4-BE49-F238E27FC236}">
-                    <a16:creationId xmlns:a16="http://schemas.microsoft.com/office/drawing/2014/main" id="{63931036-8C6E-7FA5-89AF-8C07004C3FE3}"/>
-                  </a:ext>
-                </a:extLst>
-              </p:cNvPr>
-              <p:cNvPicPr>
-                <a:picLocks noChangeAspect="1"/>
-              </p:cNvPicPr>
-              <p:nvPr/>
-            </p:nvPicPr>
-            <p:blipFill>
-              <a:blip r:embed="rId6">
-                <a:extLst>
-                  <a:ext uri="{28A0092B-C50C-407E-A947-70E740481C1C}">
-                    <a14:useLocalDpi xmlns:a14="http://schemas.microsoft.com/office/drawing/2010/main" val="0"/>
-                  </a:ext>
-                  <a:ext uri="{96DAC541-7B7A-43D3-8B79-37D633B846F1}">
-                    <asvg:svgBlip xmlns:asvg="http://schemas.microsoft.com/office/drawing/2016/SVG/main" r:embed="rId7"/>
-                  </a:ext>
-                </a:extLst>
-              </a:blip>
-              <a:stretch>
-                <a:fillRect/>
-              </a:stretch>
-            </p:blipFill>
-            <p:spPr>
-              <a:xfrm>
-                <a:off x="4928659" y="4993467"/>
-                <a:ext cx="180000" cy="180000"/>
-              </a:xfrm>
-              <a:prstGeom prst="rect">
-                <a:avLst/>
-              </a:prstGeom>
-            </p:spPr>
-          </p:pic>
-          <p:pic>
-            <p:nvPicPr>
-              <p:cNvPr id="61" name="Graphic 60" descr="Add with solid fill">
-                <a:extLst>
-                  <a:ext uri="{FF2B5EF4-FFF2-40B4-BE49-F238E27FC236}">
-                    <a16:creationId xmlns:a16="http://schemas.microsoft.com/office/drawing/2014/main" id="{AB93157F-D57F-0C57-A8A1-0E1B378AB2F7}"/>
-                  </a:ext>
-                </a:extLst>
-              </p:cNvPr>
-              <p:cNvPicPr>
-                <a:picLocks noChangeAspect="1"/>
-              </p:cNvPicPr>
-              <p:nvPr/>
-            </p:nvPicPr>
-            <p:blipFill>
-              <a:blip r:embed="rId6">
-                <a:extLst>
-                  <a:ext uri="{28A0092B-C50C-407E-A947-70E740481C1C}">
-                    <a14:useLocalDpi xmlns:a14="http://schemas.microsoft.com/office/drawing/2010/main" val="0"/>
-                  </a:ext>
-                  <a:ext uri="{96DAC541-7B7A-43D3-8B79-37D633B846F1}">
-                    <asvg:svgBlip xmlns:asvg="http://schemas.microsoft.com/office/drawing/2016/SVG/main" r:embed="rId7"/>
-                  </a:ext>
-                </a:extLst>
-              </a:blip>
-              <a:stretch>
-                <a:fillRect/>
-              </a:stretch>
-            </p:blipFill>
-            <p:spPr>
-              <a:xfrm>
-                <a:off x="4490246" y="5014467"/>
-                <a:ext cx="180000" cy="180000"/>
-              </a:xfrm>
-              <a:prstGeom prst="rect">
-                <a:avLst/>
-              </a:prstGeom>
-            </p:spPr>
-          </p:pic>
-          <p:pic>
-            <p:nvPicPr>
-              <p:cNvPr id="62" name="Graphic 61" descr="Add with solid fill">
-                <a:extLst>
-                  <a:ext uri="{FF2B5EF4-FFF2-40B4-BE49-F238E27FC236}">
-                    <a16:creationId xmlns:a16="http://schemas.microsoft.com/office/drawing/2014/main" id="{AA021D84-12A5-6FCC-2CFF-5BD596BF3130}"/>
-                  </a:ext>
-                </a:extLst>
-              </p:cNvPr>
-              <p:cNvPicPr>
-                <a:picLocks noChangeAspect="1"/>
-              </p:cNvPicPr>
-              <p:nvPr/>
-            </p:nvPicPr>
-            <p:blipFill>
-              <a:blip r:embed="rId6">
-                <a:extLst>
-                  <a:ext uri="{28A0092B-C50C-407E-A947-70E740481C1C}">
-                    <a14:useLocalDpi xmlns:a14="http://schemas.microsoft.com/office/drawing/2010/main" val="0"/>
-                  </a:ext>
-                  <a:ext uri="{96DAC541-7B7A-43D3-8B79-37D633B846F1}">
-                    <asvg:svgBlip xmlns:asvg="http://schemas.microsoft.com/office/drawing/2016/SVG/main" r:embed="rId7"/>
-                  </a:ext>
-                </a:extLst>
-              </a:blip>
-              <a:stretch>
-                <a:fillRect/>
-              </a:stretch>
-            </p:blipFill>
-            <p:spPr>
-              <a:xfrm>
-                <a:off x="6882032" y="2227289"/>
-                <a:ext cx="180000" cy="180000"/>
-              </a:xfrm>
-              <a:prstGeom prst="rect">
-                <a:avLst/>
-              </a:prstGeom>
-            </p:spPr>
-          </p:pic>
-          <p:pic>
-            <p:nvPicPr>
-              <p:cNvPr id="63" name="Graphic 62" descr="Add with solid fill">
-                <a:extLst>
-                  <a:ext uri="{FF2B5EF4-FFF2-40B4-BE49-F238E27FC236}">
-                    <a16:creationId xmlns:a16="http://schemas.microsoft.com/office/drawing/2014/main" id="{D6DC3A51-5CCC-59FE-A8C8-72E6E6693AF4}"/>
-                  </a:ext>
-                </a:extLst>
-              </p:cNvPr>
-              <p:cNvPicPr>
-                <a:picLocks noChangeAspect="1"/>
-              </p:cNvPicPr>
-              <p:nvPr/>
-            </p:nvPicPr>
-            <p:blipFill>
-              <a:blip r:embed="rId6">
-                <a:extLst>
-                  <a:ext uri="{28A0092B-C50C-407E-A947-70E740481C1C}">
-                    <a14:useLocalDpi xmlns:a14="http://schemas.microsoft.com/office/drawing/2010/main" val="0"/>
-                  </a:ext>
-                  <a:ext uri="{96DAC541-7B7A-43D3-8B79-37D633B846F1}">
-                    <asvg:svgBlip xmlns:asvg="http://schemas.microsoft.com/office/drawing/2016/SVG/main" r:embed="rId7"/>
-                  </a:ext>
-                </a:extLst>
-              </a:blip>
-              <a:stretch>
-                <a:fillRect/>
-              </a:stretch>
-            </p:blipFill>
-            <p:spPr>
-              <a:xfrm>
-                <a:off x="6626314" y="2554757"/>
-                <a:ext cx="180000" cy="180000"/>
-              </a:xfrm>
-              <a:prstGeom prst="rect">
-                <a:avLst/>
-              </a:prstGeom>
-            </p:spPr>
-          </p:pic>
-          <p:pic>
-            <p:nvPicPr>
-              <p:cNvPr id="64" name="Graphic 63" descr="Add with solid fill">
-                <a:extLst>
-                  <a:ext uri="{FF2B5EF4-FFF2-40B4-BE49-F238E27FC236}">
-                    <a16:creationId xmlns:a16="http://schemas.microsoft.com/office/drawing/2014/main" id="{A04FEAB6-EC9F-037A-ED5A-55077769264F}"/>
-                  </a:ext>
-                </a:extLst>
-              </p:cNvPr>
-              <p:cNvPicPr>
-                <a:picLocks noChangeAspect="1"/>
-              </p:cNvPicPr>
-              <p:nvPr/>
-            </p:nvPicPr>
-            <p:blipFill>
-              <a:blip r:embed="rId6">
-                <a:extLst>
-                  <a:ext uri="{28A0092B-C50C-407E-A947-70E740481C1C}">
-                    <a14:useLocalDpi xmlns:a14="http://schemas.microsoft.com/office/drawing/2010/main" val="0"/>
-                  </a:ext>
-                  <a:ext uri="{96DAC541-7B7A-43D3-8B79-37D633B846F1}">
-                    <asvg:svgBlip xmlns:asvg="http://schemas.microsoft.com/office/drawing/2016/SVG/main" r:embed="rId7"/>
-                  </a:ext>
-                </a:extLst>
-              </a:blip>
-              <a:stretch>
-                <a:fillRect/>
-              </a:stretch>
-            </p:blipFill>
-            <p:spPr>
-              <a:xfrm>
-                <a:off x="6741688" y="2884761"/>
-                <a:ext cx="180000" cy="180000"/>
-              </a:xfrm>
-              <a:prstGeom prst="rect">
-                <a:avLst/>
-              </a:prstGeom>
-            </p:spPr>
-          </p:pic>
-        </p:grpSp>
-        <p:grpSp>
-          <p:nvGrpSpPr>
-            <p:cNvPr id="151" name="Group 150">
-              <a:extLst>
-                <a:ext uri="{FF2B5EF4-FFF2-40B4-BE49-F238E27FC236}">
-                  <a16:creationId xmlns:a16="http://schemas.microsoft.com/office/drawing/2014/main" id="{EE8D019E-6EBE-84AC-59DE-573F8023424A}"/>
-                </a:ext>
-              </a:extLst>
-            </p:cNvPr>
-            <p:cNvGrpSpPr/>
-            <p:nvPr/>
-          </p:nvGrpSpPr>
-          <p:grpSpPr>
-            <a:xfrm>
-              <a:off x="246621" y="1388933"/>
-              <a:ext cx="5679319" cy="4975894"/>
-              <a:chOff x="246621" y="1388933"/>
-              <a:chExt cx="5679319" cy="4975894"/>
-            </a:xfrm>
-          </p:grpSpPr>
-          <p:sp>
-            <p:nvSpPr>
-              <p:cNvPr id="66" name="Rectangle: Rounded Corners 65">
-                <a:extLst>
-                  <a:ext uri="{FF2B5EF4-FFF2-40B4-BE49-F238E27FC236}">
-                    <a16:creationId xmlns:a16="http://schemas.microsoft.com/office/drawing/2014/main" id="{75D83F83-8C2E-B324-C47C-747178185F84}"/>
-                  </a:ext>
-                </a:extLst>
-              </p:cNvPr>
-              <p:cNvSpPr/>
-              <p:nvPr/>
-            </p:nvSpPr>
-            <p:spPr>
-              <a:xfrm>
-                <a:off x="5415324" y="5866452"/>
-                <a:ext cx="510616" cy="498375"/>
-              </a:xfrm>
-              <a:prstGeom prst="roundRect">
-                <a:avLst/>
-              </a:prstGeom>
-              <a:noFill/>
-              <a:ln w="38100">
-                <a:noFill/>
-              </a:ln>
-            </p:spPr>
-            <p:style>
-              <a:lnRef idx="2">
-                <a:schemeClr val="dk1"/>
-              </a:lnRef>
-              <a:fillRef idx="1">
-                <a:schemeClr val="lt1"/>
-              </a:fillRef>
-              <a:effectRef idx="0">
-                <a:schemeClr val="dk1"/>
-              </a:effectRef>
-              <a:fontRef idx="minor">
-                <a:schemeClr val="dk1"/>
-              </a:fontRef>
-            </p:style>
-            <p:txBody>
-              <a:bodyPr rtlCol="0" anchor="ctr"/>
-              <a:lstStyle/>
-              <a:p>
-                <a:pPr algn="ctr"/>
-                <a:r>
-                  <a:rPr lang="en-GB" b="1" dirty="0"/>
-                  <a:t>x</a:t>
-                </a:r>
-              </a:p>
-            </p:txBody>
-          </p:sp>
-          <p:grpSp>
-            <p:nvGrpSpPr>
-              <p:cNvPr id="108" name="Group 107">
-                <a:extLst>
-                  <a:ext uri="{FF2B5EF4-FFF2-40B4-BE49-F238E27FC236}">
-                    <a16:creationId xmlns:a16="http://schemas.microsoft.com/office/drawing/2014/main" id="{210EF965-9BD4-4B85-8386-5211F4B62BA0}"/>
-                  </a:ext>
-                </a:extLst>
-              </p:cNvPr>
-              <p:cNvGrpSpPr/>
-              <p:nvPr/>
-            </p:nvGrpSpPr>
-            <p:grpSpPr>
-              <a:xfrm>
-                <a:off x="750210" y="1638121"/>
-                <a:ext cx="4956274" cy="4364167"/>
-                <a:chOff x="3343664" y="1816222"/>
-                <a:chExt cx="3651237" cy="3292868"/>
-              </a:xfrm>
-            </p:grpSpPr>
-            <p:cxnSp>
-              <p:nvCxnSpPr>
-                <p:cNvPr id="109" name="Straight Arrow Connector 108">
-                  <a:extLst>
-                    <a:ext uri="{FF2B5EF4-FFF2-40B4-BE49-F238E27FC236}">
-                      <a16:creationId xmlns:a16="http://schemas.microsoft.com/office/drawing/2014/main" id="{678D7AEF-C1E0-93C5-7015-C58AEBBD079E}"/>
-                    </a:ext>
-                  </a:extLst>
-                </p:cNvPr>
-                <p:cNvCxnSpPr/>
-                <p:nvPr/>
-              </p:nvCxnSpPr>
-              <p:spPr>
-                <a:xfrm flipV="1">
-                  <a:off x="3351474" y="1816222"/>
-                  <a:ext cx="0" cy="3292868"/>
-                </a:xfrm>
-                <a:prstGeom prst="straightConnector1">
-                  <a:avLst/>
-                </a:prstGeom>
-                <a:ln w="28575">
-                  <a:tailEnd type="triangle"/>
-                </a:ln>
-              </p:spPr>
-              <p:style>
-                <a:lnRef idx="1">
-                  <a:schemeClr val="dk1"/>
-                </a:lnRef>
-                <a:fillRef idx="0">
-                  <a:schemeClr val="dk1"/>
-                </a:fillRef>
-                <a:effectRef idx="0">
-                  <a:schemeClr val="dk1"/>
-                </a:effectRef>
-                <a:fontRef idx="minor">
-                  <a:schemeClr val="tx1"/>
-                </a:fontRef>
-              </p:style>
-            </p:cxnSp>
-            <p:cxnSp>
-              <p:nvCxnSpPr>
-                <p:cNvPr id="110" name="Straight Arrow Connector 109">
-                  <a:extLst>
-                    <a:ext uri="{FF2B5EF4-FFF2-40B4-BE49-F238E27FC236}">
-                      <a16:creationId xmlns:a16="http://schemas.microsoft.com/office/drawing/2014/main" id="{816A7CB8-BE50-35BE-D4B6-99796A8B95A7}"/>
-                    </a:ext>
-                  </a:extLst>
-                </p:cNvPr>
-                <p:cNvCxnSpPr>
-                  <a:cxnSpLocks/>
-                </p:cNvCxnSpPr>
-                <p:nvPr/>
-              </p:nvCxnSpPr>
-              <p:spPr>
-                <a:xfrm rot="5400000" flipV="1">
-                  <a:off x="5169283" y="3279891"/>
-                  <a:ext cx="0" cy="3651237"/>
-                </a:xfrm>
-                <a:prstGeom prst="straightConnector1">
-                  <a:avLst/>
-                </a:prstGeom>
-                <a:ln w="28575">
-                  <a:tailEnd type="triangle"/>
-                </a:ln>
-              </p:spPr>
-              <p:style>
-                <a:lnRef idx="1">
-                  <a:schemeClr val="dk1"/>
-                </a:lnRef>
-                <a:fillRef idx="0">
-                  <a:schemeClr val="dk1"/>
-                </a:fillRef>
-                <a:effectRef idx="0">
-                  <a:schemeClr val="dk1"/>
-                </a:effectRef>
-                <a:fontRef idx="minor">
-                  <a:schemeClr val="tx1"/>
-                </a:fontRef>
-              </p:style>
-            </p:cxnSp>
-          </p:grpSp>
-          <p:sp>
-            <p:nvSpPr>
-              <p:cNvPr id="111" name="Rectangle: Rounded Corners 110">
-                <a:extLst>
-                  <a:ext uri="{FF2B5EF4-FFF2-40B4-BE49-F238E27FC236}">
-                    <a16:creationId xmlns:a16="http://schemas.microsoft.com/office/drawing/2014/main" id="{C6705719-B955-0934-3E0A-55FEC3B117EF}"/>
-                  </a:ext>
-                </a:extLst>
-              </p:cNvPr>
-              <p:cNvSpPr/>
-              <p:nvPr/>
-            </p:nvSpPr>
-            <p:spPr>
-              <a:xfrm>
-                <a:off x="246621" y="1388933"/>
-                <a:ext cx="673955" cy="498375"/>
-              </a:xfrm>
-              <a:prstGeom prst="roundRect">
-                <a:avLst/>
-              </a:prstGeom>
-              <a:noFill/>
-              <a:ln w="38100">
-                <a:noFill/>
-              </a:ln>
-            </p:spPr>
-            <p:style>
-              <a:lnRef idx="2">
-                <a:schemeClr val="dk1"/>
-              </a:lnRef>
-              <a:fillRef idx="1">
-                <a:schemeClr val="lt1"/>
-              </a:fillRef>
-              <a:effectRef idx="0">
-                <a:schemeClr val="dk1"/>
-              </a:effectRef>
-              <a:fontRef idx="minor">
-                <a:schemeClr val="dk1"/>
-              </a:fontRef>
-            </p:style>
-            <p:txBody>
-              <a:bodyPr rtlCol="0" anchor="ctr"/>
-              <a:lstStyle/>
-              <a:p>
-                <a:pPr algn="ctr"/>
-                <a:r>
-                  <a:rPr lang="en-GB" b="1" dirty="0"/>
-                  <a:t>y</a:t>
-                </a:r>
-              </a:p>
-            </p:txBody>
-          </p:sp>
-        </p:grpSp>
-        <p:cxnSp>
-          <p:nvCxnSpPr>
-            <p:cNvPr id="153" name="Straight Arrow Connector 152">
-              <a:extLst>
-                <a:ext uri="{FF2B5EF4-FFF2-40B4-BE49-F238E27FC236}">
-                  <a16:creationId xmlns:a16="http://schemas.microsoft.com/office/drawing/2014/main" id="{1ECC2CB4-4AF4-97EB-51B6-A3D5DF2E670B}"/>
-                </a:ext>
-              </a:extLst>
-            </p:cNvPr>
-            <p:cNvCxnSpPr>
-              <a:cxnSpLocks/>
-            </p:cNvCxnSpPr>
-            <p:nvPr/>
-          </p:nvCxnSpPr>
-          <p:spPr>
-            <a:xfrm rot="5400000" flipV="1">
-              <a:off x="5168576" y="2463734"/>
-              <a:ext cx="0" cy="2880000"/>
-            </a:xfrm>
-            <a:prstGeom prst="straightConnector1">
-              <a:avLst/>
-            </a:prstGeom>
-            <a:ln w="28575">
-              <a:solidFill>
-                <a:srgbClr val="C00000"/>
-              </a:solidFill>
-              <a:tailEnd type="triangle"/>
-            </a:ln>
-          </p:spPr>
-          <p:style>
-            <a:lnRef idx="1">
-              <a:schemeClr val="dk1"/>
-            </a:lnRef>
-            <a:fillRef idx="0">
-              <a:schemeClr val="dk1"/>
-            </a:fillRef>
-            <a:effectRef idx="0">
-              <a:schemeClr val="dk1"/>
-            </a:effectRef>
-            <a:fontRef idx="minor">
-              <a:schemeClr val="tx1"/>
-            </a:fontRef>
-          </p:style>
-        </p:cxnSp>
-        <p:sp>
-          <p:nvSpPr>
-            <p:cNvPr id="154" name="Rectangle: Rounded Corners 153">
-              <a:extLst>
-                <a:ext uri="{FF2B5EF4-FFF2-40B4-BE49-F238E27FC236}">
-                  <a16:creationId xmlns:a16="http://schemas.microsoft.com/office/drawing/2014/main" id="{29238152-51E8-B98A-761E-48329625555E}"/>
-                </a:ext>
-              </a:extLst>
-            </p:cNvPr>
-            <p:cNvSpPr/>
-            <p:nvPr/>
-          </p:nvSpPr>
-          <p:spPr>
-            <a:xfrm>
-              <a:off x="5445604" y="3400615"/>
-              <a:ext cx="1266688" cy="498375"/>
-            </a:xfrm>
-            <a:prstGeom prst="roundRect">
-              <a:avLst/>
-            </a:prstGeom>
-            <a:noFill/>
-            <a:ln w="38100">
-              <a:noFill/>
-            </a:ln>
-          </p:spPr>
-          <p:style>
-            <a:lnRef idx="2">
-              <a:schemeClr val="dk1"/>
-            </a:lnRef>
-            <a:fillRef idx="1">
-              <a:schemeClr val="lt1"/>
-            </a:fillRef>
-            <a:effectRef idx="0">
-              <a:schemeClr val="dk1"/>
-            </a:effectRef>
-            <a:fontRef idx="minor">
-              <a:schemeClr val="dk1"/>
-            </a:fontRef>
-          </p:style>
-          <p:txBody>
-            <a:bodyPr rtlCol="0" anchor="ctr"/>
-            <a:lstStyle/>
-            <a:p>
-              <a:pPr algn="ctr"/>
-              <a:r>
-                <a:rPr lang="en-GB" b="1" dirty="0">
-                  <a:solidFill>
-                    <a:srgbClr val="C00000"/>
-                  </a:solidFill>
-                </a:rPr>
-                <a:t>train</a:t>
-              </a:r>
-            </a:p>
-          </p:txBody>
-        </p:sp>
-        <p:grpSp>
-          <p:nvGrpSpPr>
-            <p:cNvPr id="165" name="Group 164">
-              <a:extLst>
-                <a:ext uri="{FF2B5EF4-FFF2-40B4-BE49-F238E27FC236}">
-                  <a16:creationId xmlns:a16="http://schemas.microsoft.com/office/drawing/2014/main" id="{DE204E32-9C73-2425-B565-F09A57368C3B}"/>
-                </a:ext>
-              </a:extLst>
-            </p:cNvPr>
-            <p:cNvGrpSpPr/>
-            <p:nvPr/>
-          </p:nvGrpSpPr>
-          <p:grpSpPr>
-            <a:xfrm>
-              <a:off x="6239655" y="1374942"/>
-              <a:ext cx="5673258" cy="4989885"/>
-              <a:chOff x="6239655" y="1374942"/>
-              <a:chExt cx="5673258" cy="4989885"/>
-            </a:xfrm>
-          </p:grpSpPr>
-          <p:grpSp>
-            <p:nvGrpSpPr>
-              <p:cNvPr id="152" name="Group 151">
-                <a:extLst>
-                  <a:ext uri="{FF2B5EF4-FFF2-40B4-BE49-F238E27FC236}">
-                    <a16:creationId xmlns:a16="http://schemas.microsoft.com/office/drawing/2014/main" id="{D5ED8562-76D4-77DB-87EF-C6CBA57DEF17}"/>
-                  </a:ext>
-                </a:extLst>
-              </p:cNvPr>
-              <p:cNvGrpSpPr/>
-              <p:nvPr/>
-            </p:nvGrpSpPr>
-            <p:grpSpPr>
-              <a:xfrm>
-                <a:off x="6239655" y="1476674"/>
-                <a:ext cx="5673258" cy="4888153"/>
-                <a:chOff x="6202413" y="1541333"/>
-                <a:chExt cx="5673258" cy="4888153"/>
-              </a:xfrm>
-            </p:grpSpPr>
-            <p:sp>
-              <p:nvSpPr>
-                <p:cNvPr id="146" name="Rectangle: Rounded Corners 145">
-                  <a:extLst>
-                    <a:ext uri="{FF2B5EF4-FFF2-40B4-BE49-F238E27FC236}">
-                      <a16:creationId xmlns:a16="http://schemas.microsoft.com/office/drawing/2014/main" id="{15BFAF73-762E-D614-3241-26E4D99FECC6}"/>
-                    </a:ext>
-                  </a:extLst>
-                </p:cNvPr>
-                <p:cNvSpPr/>
-                <p:nvPr/>
-              </p:nvSpPr>
-              <p:spPr>
-                <a:xfrm>
-                  <a:off x="11365055" y="5931111"/>
-                  <a:ext cx="510616" cy="498375"/>
-                </a:xfrm>
-                <a:prstGeom prst="roundRect">
-                  <a:avLst/>
-                </a:prstGeom>
-                <a:noFill/>
-                <a:ln w="38100">
-                  <a:noFill/>
-                </a:ln>
-              </p:spPr>
-              <p:style>
-                <a:lnRef idx="2">
-                  <a:schemeClr val="dk1"/>
-                </a:lnRef>
-                <a:fillRef idx="1">
-                  <a:schemeClr val="lt1"/>
-                </a:fillRef>
-                <a:effectRef idx="0">
-                  <a:schemeClr val="dk1"/>
-                </a:effectRef>
-                <a:fontRef idx="minor">
-                  <a:schemeClr val="dk1"/>
-                </a:fontRef>
-              </p:style>
-              <p:txBody>
-                <a:bodyPr rtlCol="0" anchor="ctr"/>
-                <a:lstStyle/>
-                <a:p>
-                  <a:pPr algn="ctr"/>
-                  <a:r>
-                    <a:rPr lang="en-GB" b="1" dirty="0"/>
-                    <a:t>x</a:t>
-                  </a:r>
-                </a:p>
-              </p:txBody>
-            </p:sp>
-            <p:grpSp>
-              <p:nvGrpSpPr>
-                <p:cNvPr id="147" name="Group 146">
-                  <a:extLst>
-                    <a:ext uri="{FF2B5EF4-FFF2-40B4-BE49-F238E27FC236}">
-                      <a16:creationId xmlns:a16="http://schemas.microsoft.com/office/drawing/2014/main" id="{753B7EBC-31D3-744A-D7AC-CC3D0CECE79C}"/>
-                    </a:ext>
-                  </a:extLst>
-                </p:cNvPr>
-                <p:cNvGrpSpPr/>
-                <p:nvPr/>
-              </p:nvGrpSpPr>
-              <p:grpSpPr>
-                <a:xfrm>
-                  <a:off x="6706003" y="1705176"/>
-                  <a:ext cx="4956274" cy="4364163"/>
-                  <a:chOff x="3343665" y="1816227"/>
-                  <a:chExt cx="3651237" cy="3292868"/>
-                </a:xfrm>
-              </p:grpSpPr>
-              <p:cxnSp>
-                <p:nvCxnSpPr>
-                  <p:cNvPr id="148" name="Straight Arrow Connector 147">
-                    <a:extLst>
-                      <a:ext uri="{FF2B5EF4-FFF2-40B4-BE49-F238E27FC236}">
-                        <a16:creationId xmlns:a16="http://schemas.microsoft.com/office/drawing/2014/main" id="{4DEBB8C4-3939-112F-6576-45A5394439A7}"/>
-                      </a:ext>
-                    </a:extLst>
-                  </p:cNvPr>
-                  <p:cNvCxnSpPr/>
-                  <p:nvPr/>
-                </p:nvCxnSpPr>
-                <p:spPr>
-                  <a:xfrm flipV="1">
-                    <a:off x="3351474" y="1816227"/>
-                    <a:ext cx="0" cy="3292868"/>
-                  </a:xfrm>
-                  <a:prstGeom prst="straightConnector1">
-                    <a:avLst/>
-                  </a:prstGeom>
-                  <a:ln w="28575">
-                    <a:tailEnd type="triangle"/>
-                  </a:ln>
-                </p:spPr>
-                <p:style>
-                  <a:lnRef idx="1">
-                    <a:schemeClr val="dk1"/>
-                  </a:lnRef>
-                  <a:fillRef idx="0">
-                    <a:schemeClr val="dk1"/>
-                  </a:fillRef>
-                  <a:effectRef idx="0">
-                    <a:schemeClr val="dk1"/>
-                  </a:effectRef>
-                  <a:fontRef idx="minor">
-                    <a:schemeClr val="tx1"/>
-                  </a:fontRef>
-                </p:style>
-              </p:cxnSp>
-              <p:cxnSp>
-                <p:nvCxnSpPr>
-                  <p:cNvPr id="149" name="Straight Arrow Connector 148">
-                    <a:extLst>
-                      <a:ext uri="{FF2B5EF4-FFF2-40B4-BE49-F238E27FC236}">
-                        <a16:creationId xmlns:a16="http://schemas.microsoft.com/office/drawing/2014/main" id="{2209E6AF-0572-FFBE-AC42-5579D2AC58E8}"/>
-                      </a:ext>
-                    </a:extLst>
-                  </p:cNvPr>
-                  <p:cNvCxnSpPr>
-                    <a:cxnSpLocks/>
-                  </p:cNvCxnSpPr>
-                  <p:nvPr/>
-                </p:nvCxnSpPr>
-                <p:spPr>
-                  <a:xfrm rot="5400000" flipV="1">
-                    <a:off x="5169284" y="3279900"/>
-                    <a:ext cx="0" cy="3651237"/>
-                  </a:xfrm>
-                  <a:prstGeom prst="straightConnector1">
-                    <a:avLst/>
-                  </a:prstGeom>
-                  <a:ln w="28575">
-                    <a:tailEnd type="triangle"/>
-                  </a:ln>
-                </p:spPr>
-                <p:style>
-                  <a:lnRef idx="1">
-                    <a:schemeClr val="dk1"/>
-                  </a:lnRef>
-                  <a:fillRef idx="0">
-                    <a:schemeClr val="dk1"/>
-                  </a:fillRef>
-                  <a:effectRef idx="0">
-                    <a:schemeClr val="dk1"/>
-                  </a:effectRef>
-                  <a:fontRef idx="minor">
-                    <a:schemeClr val="tx1"/>
-                  </a:fontRef>
-                </p:style>
-              </p:cxnSp>
-            </p:grpSp>
-            <p:sp>
-              <p:nvSpPr>
-                <p:cNvPr id="150" name="Rectangle: Rounded Corners 149">
-                  <a:extLst>
-                    <a:ext uri="{FF2B5EF4-FFF2-40B4-BE49-F238E27FC236}">
-                      <a16:creationId xmlns:a16="http://schemas.microsoft.com/office/drawing/2014/main" id="{EA5247DE-3D9E-FE57-DB59-243D911F51B9}"/>
-                    </a:ext>
-                  </a:extLst>
-                </p:cNvPr>
-                <p:cNvSpPr/>
-                <p:nvPr/>
-              </p:nvSpPr>
-              <p:spPr>
-                <a:xfrm>
-                  <a:off x="6202413" y="1541333"/>
-                  <a:ext cx="673955" cy="498375"/>
-                </a:xfrm>
-                <a:prstGeom prst="roundRect">
-                  <a:avLst/>
-                </a:prstGeom>
-                <a:noFill/>
-                <a:ln w="38100">
-                  <a:noFill/>
-                </a:ln>
-              </p:spPr>
-              <p:style>
-                <a:lnRef idx="2">
-                  <a:schemeClr val="dk1"/>
-                </a:lnRef>
-                <a:fillRef idx="1">
-                  <a:schemeClr val="lt1"/>
-                </a:fillRef>
-                <a:effectRef idx="0">
-                  <a:schemeClr val="dk1"/>
-                </a:effectRef>
-                <a:fontRef idx="minor">
-                  <a:schemeClr val="dk1"/>
-                </a:fontRef>
-              </p:style>
-              <p:txBody>
-                <a:bodyPr rtlCol="0" anchor="ctr"/>
-                <a:lstStyle/>
-                <a:p>
-                  <a:pPr algn="ctr"/>
-                  <a:r>
-                    <a:rPr lang="en-GB" b="1" dirty="0"/>
-                    <a:t>y</a:t>
-                  </a:r>
-                </a:p>
-              </p:txBody>
-            </p:sp>
-          </p:grpSp>
-          <p:cxnSp>
-            <p:nvCxnSpPr>
-              <p:cNvPr id="155" name="Straight Arrow Connector 154">
-                <a:extLst>
-                  <a:ext uri="{FF2B5EF4-FFF2-40B4-BE49-F238E27FC236}">
-                    <a16:creationId xmlns:a16="http://schemas.microsoft.com/office/drawing/2014/main" id="{4F1B6E0D-EFE0-6EAE-9EC1-1F927C229FC2}"/>
-                  </a:ext>
-                </a:extLst>
-              </p:cNvPr>
-              <p:cNvCxnSpPr>
-                <a:cxnSpLocks/>
-              </p:cNvCxnSpPr>
-              <p:nvPr/>
-            </p:nvCxnSpPr>
-            <p:spPr>
-              <a:xfrm flipV="1">
-                <a:off x="7023793" y="1788738"/>
-                <a:ext cx="3332854" cy="3908600"/>
-              </a:xfrm>
-              <a:prstGeom prst="straightConnector1">
-                <a:avLst/>
-              </a:prstGeom>
-              <a:ln w="28575">
-                <a:solidFill>
-                  <a:srgbClr val="C00000"/>
-                </a:solidFill>
-                <a:headEnd type="none" w="med" len="med"/>
-                <a:tailEnd type="none" w="med" len="med"/>
-              </a:ln>
-            </p:spPr>
-            <p:style>
-              <a:lnRef idx="1">
-                <a:schemeClr val="dk1"/>
-              </a:lnRef>
-              <a:fillRef idx="0">
-                <a:schemeClr val="dk1"/>
-              </a:fillRef>
-              <a:effectRef idx="0">
-                <a:schemeClr val="dk1"/>
-              </a:effectRef>
-              <a:fontRef idx="minor">
-                <a:schemeClr val="tx1"/>
-              </a:fontRef>
-            </p:style>
-          </p:cxnSp>
-          <p:sp>
-            <p:nvSpPr>
-              <p:cNvPr id="160" name="Rectangle: Rounded Corners 159">
-                <a:extLst>
-                  <a:ext uri="{FF2B5EF4-FFF2-40B4-BE49-F238E27FC236}">
-                    <a16:creationId xmlns:a16="http://schemas.microsoft.com/office/drawing/2014/main" id="{0D5A852C-FDC2-E8D5-DAE9-63F15740EECF}"/>
-                  </a:ext>
-                </a:extLst>
-              </p:cNvPr>
-              <p:cNvSpPr/>
-              <p:nvPr/>
-            </p:nvSpPr>
-            <p:spPr>
-              <a:xfrm>
-                <a:off x="8839692" y="1374942"/>
-                <a:ext cx="3064217" cy="498375"/>
-              </a:xfrm>
-              <a:prstGeom prst="roundRect">
-                <a:avLst/>
-              </a:prstGeom>
-              <a:noFill/>
-              <a:ln w="38100">
-                <a:noFill/>
-              </a:ln>
-            </p:spPr>
-            <p:style>
-              <a:lnRef idx="2">
-                <a:schemeClr val="dk1"/>
-              </a:lnRef>
-              <a:fillRef idx="1">
-                <a:schemeClr val="lt1"/>
-              </a:fillRef>
-              <a:effectRef idx="0">
-                <a:schemeClr val="dk1"/>
-              </a:effectRef>
-              <a:fontRef idx="minor">
-                <a:schemeClr val="dk1"/>
-              </a:fontRef>
-            </p:style>
-            <p:txBody>
-              <a:bodyPr rtlCol="0" anchor="ctr"/>
-              <a:lstStyle/>
-              <a:p>
-                <a:pPr algn="ctr"/>
-                <a:r>
-                  <a:rPr lang="en-GB" b="1" dirty="0">
-                    <a:solidFill>
-                      <a:srgbClr val="C00000"/>
-                    </a:solidFill>
-                  </a:rPr>
-                  <a:t>The boundary line: y=ax+b</a:t>
-                </a:r>
-              </a:p>
-            </p:txBody>
-          </p:sp>
-        </p:grpSp>
-      </p:grpSp>
-      <p:pic>
-        <p:nvPicPr>
-          <p:cNvPr id="3" name="Graphic 2" descr="Add with solid fill">
-            <a:extLst>
-              <a:ext uri="{FF2B5EF4-FFF2-40B4-BE49-F238E27FC236}">
-                <a16:creationId xmlns:a16="http://schemas.microsoft.com/office/drawing/2014/main" id="{3265C9CC-C23D-3D64-8C8D-0F660764EDF0}"/>
-              </a:ext>
-            </a:extLst>
-          </p:cNvPr>
-          <p:cNvPicPr>
-            <a:picLocks noChangeAspect="1"/>
-          </p:cNvPicPr>
-          <p:nvPr/>
-        </p:nvPicPr>
-        <p:blipFill>
-          <a:blip r:embed="rId4">
-            <a:extLst>
-              <a:ext uri="{28A0092B-C50C-407E-A947-70E740481C1C}">
-                <a14:useLocalDpi xmlns:a14="http://schemas.microsoft.com/office/drawing/2010/main" val="0"/>
-              </a:ext>
-              <a:ext uri="{96DAC541-7B7A-43D3-8B79-37D633B846F1}">
-                <asvg:svgBlip xmlns:asvg="http://schemas.microsoft.com/office/drawing/2016/SVG/main" r:embed="rId5"/>
-              </a:ext>
-            </a:extLst>
-          </a:blip>
-          <a:stretch>
-            <a:fillRect/>
-          </a:stretch>
-        </p:blipFill>
-        <p:spPr>
-          <a:xfrm>
-            <a:off x="7640555" y="4333589"/>
-            <a:ext cx="180000" cy="180000"/>
-          </a:xfrm>
-          <a:prstGeom prst="rect">
-            <a:avLst/>
-          </a:prstGeom>
-        </p:spPr>
-      </p:pic>
+              </a:tr>
+            </a:tbl>
+          </a:graphicData>
+        </a:graphic>
+      </p:graphicFrame>
     </p:spTree>
     <p:extLst>
       <p:ext uri="{BB962C8B-B14F-4D97-AF65-F5344CB8AC3E}">
-        <p14:creationId xmlns:p14="http://schemas.microsoft.com/office/powerpoint/2010/main" val="3934179817"/>
+        <p14:creationId xmlns:p14="http://schemas.microsoft.com/office/powerpoint/2010/main" val="522987329"/>
       </p:ext>
     </p:extLst>
   </p:cSld>

</xml_diff>